<commit_message>
Update of protocol text and flowcharts, new names for cycle phases
</commit_message>
<xml_diff>
--- a/figures/Powerpoint/DesginConsensusAndDatabase.pptx
+++ b/figures/Powerpoint/DesginConsensusAndDatabase.pptx
@@ -7,6 +7,7 @@
   <p:sldIdLst>
     <p:sldId id="256" r:id="rId2"/>
     <p:sldId id="257" r:id="rId3"/>
+    <p:sldId id="258" r:id="rId4"/>
   </p:sldIdLst>
   <p:sldSz cx="19897725" cy="14057313"/>
   <p:notesSz cx="6858000" cy="9144000"/>
@@ -244,7 +245,7 @@
           <a:p>
             <a:fld id="{96B47601-FABF-AE48-BF83-19DCD761097A}" type="datetimeFigureOut">
               <a:rPr lang="en-US" smtClean="0"/>
-              <a:t>5/24/19</a:t>
+              <a:t>5/31/19</a:t>
             </a:fld>
             <a:endParaRPr lang="en-US"/>
           </a:p>
@@ -414,7 +415,7 @@
           <a:p>
             <a:fld id="{96B47601-FABF-AE48-BF83-19DCD761097A}" type="datetimeFigureOut">
               <a:rPr lang="en-US" smtClean="0"/>
-              <a:t>5/24/19</a:t>
+              <a:t>5/31/19</a:t>
             </a:fld>
             <a:endParaRPr lang="en-US"/>
           </a:p>
@@ -594,7 +595,7 @@
           <a:p>
             <a:fld id="{96B47601-FABF-AE48-BF83-19DCD761097A}" type="datetimeFigureOut">
               <a:rPr lang="en-US" smtClean="0"/>
-              <a:t>5/24/19</a:t>
+              <a:t>5/31/19</a:t>
             </a:fld>
             <a:endParaRPr lang="en-US"/>
           </a:p>
@@ -764,7 +765,7 @@
           <a:p>
             <a:fld id="{96B47601-FABF-AE48-BF83-19DCD761097A}" type="datetimeFigureOut">
               <a:rPr lang="en-US" smtClean="0"/>
-              <a:t>5/24/19</a:t>
+              <a:t>5/31/19</a:t>
             </a:fld>
             <a:endParaRPr lang="en-US"/>
           </a:p>
@@ -1008,7 +1009,7 @@
           <a:p>
             <a:fld id="{96B47601-FABF-AE48-BF83-19DCD761097A}" type="datetimeFigureOut">
               <a:rPr lang="en-US" smtClean="0"/>
-              <a:t>5/24/19</a:t>
+              <a:t>5/31/19</a:t>
             </a:fld>
             <a:endParaRPr lang="en-US"/>
           </a:p>
@@ -1240,7 +1241,7 @@
           <a:p>
             <a:fld id="{96B47601-FABF-AE48-BF83-19DCD761097A}" type="datetimeFigureOut">
               <a:rPr lang="en-US" smtClean="0"/>
-              <a:t>5/24/19</a:t>
+              <a:t>5/31/19</a:t>
             </a:fld>
             <a:endParaRPr lang="en-US"/>
           </a:p>
@@ -1607,7 +1608,7 @@
           <a:p>
             <a:fld id="{96B47601-FABF-AE48-BF83-19DCD761097A}" type="datetimeFigureOut">
               <a:rPr lang="en-US" smtClean="0"/>
-              <a:t>5/24/19</a:t>
+              <a:t>5/31/19</a:t>
             </a:fld>
             <a:endParaRPr lang="en-US"/>
           </a:p>
@@ -1725,7 +1726,7 @@
           <a:p>
             <a:fld id="{96B47601-FABF-AE48-BF83-19DCD761097A}" type="datetimeFigureOut">
               <a:rPr lang="en-US" smtClean="0"/>
-              <a:t>5/24/19</a:t>
+              <a:t>5/31/19</a:t>
             </a:fld>
             <a:endParaRPr lang="en-US"/>
           </a:p>
@@ -1820,7 +1821,7 @@
           <a:p>
             <a:fld id="{96B47601-FABF-AE48-BF83-19DCD761097A}" type="datetimeFigureOut">
               <a:rPr lang="en-US" smtClean="0"/>
-              <a:t>5/24/19</a:t>
+              <a:t>5/31/19</a:t>
             </a:fld>
             <a:endParaRPr lang="en-US"/>
           </a:p>
@@ -2097,7 +2098,7 @@
           <a:p>
             <a:fld id="{96B47601-FABF-AE48-BF83-19DCD761097A}" type="datetimeFigureOut">
               <a:rPr lang="en-US" smtClean="0"/>
-              <a:t>5/24/19</a:t>
+              <a:t>5/31/19</a:t>
             </a:fld>
             <a:endParaRPr lang="en-US"/>
           </a:p>
@@ -2354,7 +2355,7 @@
           <a:p>
             <a:fld id="{96B47601-FABF-AE48-BF83-19DCD761097A}" type="datetimeFigureOut">
               <a:rPr lang="en-US" smtClean="0"/>
-              <a:t>5/24/19</a:t>
+              <a:t>5/31/19</a:t>
             </a:fld>
             <a:endParaRPr lang="en-US"/>
           </a:p>
@@ -2567,7 +2568,7 @@
           <a:p>
             <a:fld id="{96B47601-FABF-AE48-BF83-19DCD761097A}" type="datetimeFigureOut">
               <a:rPr lang="en-US" smtClean="0"/>
-              <a:t>5/24/19</a:t>
+              <a:t>5/31/19</a:t>
             </a:fld>
             <a:endParaRPr lang="en-US"/>
           </a:p>
@@ -2986,7 +2987,7 @@
         </p:nvSpPr>
         <p:spPr>
           <a:xfrm>
-            <a:off x="16145508" y="2788145"/>
+            <a:off x="15376577" y="2767364"/>
             <a:ext cx="1496911" cy="7118559"/>
           </a:xfrm>
           <a:prstGeom prst="rect">
@@ -3042,7 +3043,7 @@
         </p:nvSpPr>
         <p:spPr>
           <a:xfrm>
-            <a:off x="4880891" y="2788145"/>
+            <a:off x="4111960" y="2767364"/>
             <a:ext cx="3254254" cy="7121032"/>
           </a:xfrm>
           <a:prstGeom prst="rect">
@@ -3100,7 +3101,7 @@
         </p:nvSpPr>
         <p:spPr>
           <a:xfrm>
-            <a:off x="8139684" y="2790591"/>
+            <a:off x="7370753" y="2769810"/>
             <a:ext cx="2710989" cy="7118578"/>
           </a:xfrm>
           <a:prstGeom prst="rect">
@@ -3156,8 +3157,8 @@
         </p:nvSpPr>
         <p:spPr>
           <a:xfrm>
-            <a:off x="14664156" y="2788145"/>
-            <a:ext cx="1483286" cy="7118563"/>
+            <a:off x="11796068" y="2767363"/>
+            <a:ext cx="1979599" cy="7118563"/>
           </a:xfrm>
           <a:prstGeom prst="rect">
             <a:avLst/>
@@ -3214,8 +3215,8 @@
         </p:nvSpPr>
         <p:spPr>
           <a:xfrm>
-            <a:off x="10848454" y="2789906"/>
-            <a:ext cx="3849077" cy="7118572"/>
+            <a:off x="10079523" y="2769125"/>
+            <a:ext cx="1725025" cy="7118572"/>
           </a:xfrm>
           <a:prstGeom prst="rect">
             <a:avLst/>
@@ -3272,7 +3273,7 @@
         </p:nvCxnSpPr>
         <p:spPr>
           <a:xfrm>
-            <a:off x="3178772" y="6664294"/>
+            <a:off x="2409841" y="6643513"/>
             <a:ext cx="14220000" cy="0"/>
           </a:xfrm>
           <a:prstGeom prst="straightConnector1">
@@ -3314,7 +3315,7 @@
         </p:nvCxnSpPr>
         <p:spPr>
           <a:xfrm>
-            <a:off x="8129065" y="6672451"/>
+            <a:off x="7360134" y="6651670"/>
             <a:ext cx="0" cy="97655"/>
           </a:xfrm>
           <a:prstGeom prst="line">
@@ -3355,7 +3356,7 @@
         </p:nvCxnSpPr>
         <p:spPr>
           <a:xfrm>
-            <a:off x="9405163" y="6667909"/>
+            <a:off x="8636232" y="6647128"/>
             <a:ext cx="0" cy="97655"/>
           </a:xfrm>
           <a:prstGeom prst="line">
@@ -3396,7 +3397,7 @@
         </p:nvCxnSpPr>
         <p:spPr>
           <a:xfrm>
-            <a:off x="14700817" y="6664139"/>
+            <a:off x="13931886" y="6643358"/>
             <a:ext cx="0" cy="97655"/>
           </a:xfrm>
           <a:prstGeom prst="line">
@@ -3437,7 +3438,7 @@
         </p:nvSpPr>
         <p:spPr>
           <a:xfrm rot="16200000">
-            <a:off x="10964311" y="4367533"/>
+            <a:off x="10195380" y="4346752"/>
             <a:ext cx="1814452" cy="7994357"/>
           </a:xfrm>
           <a:prstGeom prst="rtTriangle">
@@ -3493,7 +3494,7 @@
         </p:nvCxnSpPr>
         <p:spPr>
           <a:xfrm flipV="1">
-            <a:off x="8144178" y="9514424"/>
+            <a:off x="7375247" y="9493643"/>
             <a:ext cx="7994358" cy="0"/>
           </a:xfrm>
           <a:prstGeom prst="straightConnector1">
@@ -3538,7 +3539,7 @@
         </p:nvSpPr>
         <p:spPr>
           <a:xfrm>
-            <a:off x="11515251" y="9374424"/>
+            <a:off x="10746320" y="9353643"/>
             <a:ext cx="1517210" cy="369332"/>
           </a:xfrm>
           <a:prstGeom prst="rect">
@@ -3586,7 +3587,7 @@
         </p:nvSpPr>
         <p:spPr>
           <a:xfrm>
-            <a:off x="6271179" y="5518168"/>
+            <a:off x="5502248" y="5497387"/>
             <a:ext cx="1578223" cy="738664"/>
           </a:xfrm>
           <a:prstGeom prst="rect">
@@ -3652,8 +3653,8 @@
           </a:p>
         </p:txBody>
       </p:sp>
-      <mc:AlternateContent xmlns:mc="http://schemas.openxmlformats.org/markup-compatibility/2006" xmlns:a14="http://schemas.microsoft.com/office/drawing/2010/main">
-        <mc:Choice Requires="a14">
+      <mc:AlternateContent xmlns:mc="http://schemas.openxmlformats.org/markup-compatibility/2006">
+        <mc:Choice xmlns:a14="http://schemas.microsoft.com/office/drawing/2010/main" Requires="a14">
           <p:sp>
             <p:nvSpPr>
               <p:cNvPr id="94" name="TextBox 93">
@@ -3668,7 +3669,7 @@
             </p:nvSpPr>
             <p:spPr>
               <a:xfrm>
-                <a:off x="10928858" y="3807537"/>
+                <a:off x="10159927" y="3786756"/>
                 <a:ext cx="3550126" cy="383823"/>
               </a:xfrm>
               <a:prstGeom prst="rect">
@@ -3819,7 +3820,7 @@
             </p:txBody>
           </p:sp>
         </mc:Choice>
-        <mc:Fallback xmlns="">
+        <mc:Fallback>
           <p:sp>
             <p:nvSpPr>
               <p:cNvPr id="94" name="TextBox 93">
@@ -3836,7 +3837,7 @@
             </p:nvSpPr>
             <p:spPr>
               <a:xfrm>
-                <a:off x="10928858" y="3807537"/>
+                <a:off x="10159927" y="3786756"/>
                 <a:ext cx="3550126" cy="383823"/>
               </a:xfrm>
               <a:prstGeom prst="rect">
@@ -3845,7 +3846,7 @@
               <a:blipFill>
                 <a:blip r:embed="rId2"/>
                 <a:stretch>
-                  <a:fillRect l="-356" b="-3226"/>
+                  <a:fillRect l="-355" b="-3125"/>
                 </a:stretch>
               </a:blipFill>
               <a:ln>
@@ -3887,7 +3888,7 @@
         </p:nvCxnSpPr>
         <p:spPr>
           <a:xfrm flipV="1">
-            <a:off x="13276797" y="5585918"/>
+            <a:off x="12507866" y="5576567"/>
             <a:ext cx="0" cy="617147"/>
           </a:xfrm>
           <a:prstGeom prst="straightConnector1">
@@ -3933,7 +3934,7 @@
         </p:nvCxnSpPr>
         <p:spPr>
           <a:xfrm flipV="1">
-            <a:off x="11707481" y="4629335"/>
+            <a:off x="10938550" y="4619984"/>
             <a:ext cx="0" cy="1644598"/>
           </a:xfrm>
           <a:prstGeom prst="straightConnector1">
@@ -3961,8 +3962,8 @@
           </a:fontRef>
         </p:style>
       </p:cxnSp>
-      <mc:AlternateContent xmlns:mc="http://schemas.openxmlformats.org/markup-compatibility/2006" xmlns:a14="http://schemas.microsoft.com/office/drawing/2010/main">
-        <mc:Choice Requires="a14">
+      <mc:AlternateContent xmlns:mc="http://schemas.openxmlformats.org/markup-compatibility/2006">
+        <mc:Choice xmlns:a14="http://schemas.microsoft.com/office/drawing/2010/main" Requires="a14">
           <p:sp>
             <p:nvSpPr>
               <p:cNvPr id="97" name="TextBox 96">
@@ -3977,7 +3978,7 @@
             </p:nvSpPr>
             <p:spPr>
               <a:xfrm>
-                <a:off x="11491505" y="4307654"/>
+                <a:off x="10722574" y="4286873"/>
                 <a:ext cx="2517561" cy="307777"/>
               </a:xfrm>
               <a:prstGeom prst="rect">
@@ -4004,7 +4005,7 @@
                     <a:ea typeface="Calibri" charset="0"/>
                     <a:cs typeface="Calibri" panose="020F0502020204030204" pitchFamily="34" charset="0"/>
                   </a:rPr>
-                  <a:t>Collection of individual vote </a:t>
+                  <a:t>Collection of candidates </a:t>
                 </a:r>
                 <a14:m>
                   <m:oMath xmlns:m="http://schemas.openxmlformats.org/officeDocument/2006/math">
@@ -4050,7 +4051,7 @@
             </p:txBody>
           </p:sp>
         </mc:Choice>
-        <mc:Fallback xmlns="">
+        <mc:Fallback>
           <p:sp>
             <p:nvSpPr>
               <p:cNvPr id="97" name="TextBox 96">
@@ -4067,7 +4068,7 @@
             </p:nvSpPr>
             <p:spPr>
               <a:xfrm>
-                <a:off x="11491505" y="4307654"/>
+                <a:off x="10722574" y="4286873"/>
                 <a:ext cx="2517561" cy="307777"/>
               </a:xfrm>
               <a:prstGeom prst="rect">
@@ -4076,7 +4077,7 @@
               <a:blipFill>
                 <a:blip r:embed="rId3"/>
                 <a:stretch>
-                  <a:fillRect l="-500" b="-15385"/>
+                  <a:fillRect l="-498" t="-3846" b="-11538"/>
                 </a:stretch>
               </a:blipFill>
               <a:ln>
@@ -4114,7 +4115,7 @@
         </p:nvSpPr>
         <p:spPr>
           <a:xfrm rot="16200000">
-            <a:off x="3579067" y="4976811"/>
+            <a:off x="2810136" y="4956030"/>
             <a:ext cx="1814452" cy="6775840"/>
           </a:xfrm>
           <a:prstGeom prst="rtTriangle">
@@ -4170,7 +4171,7 @@
         </p:nvSpPr>
         <p:spPr>
           <a:xfrm>
-            <a:off x="11326461" y="8814089"/>
+            <a:off x="10557530" y="8793308"/>
             <a:ext cx="4400488" cy="338554"/>
           </a:xfrm>
           <a:prstGeom prst="rect">
@@ -4195,8 +4196,8 @@
           </a:p>
         </p:txBody>
       </p:sp>
-      <mc:AlternateContent xmlns:mc="http://schemas.openxmlformats.org/markup-compatibility/2006" xmlns:a14="http://schemas.microsoft.com/office/drawing/2010/main">
-        <mc:Choice Requires="a14">
+      <mc:AlternateContent xmlns:mc="http://schemas.openxmlformats.org/markup-compatibility/2006">
+        <mc:Choice xmlns:a14="http://schemas.microsoft.com/office/drawing/2010/main" Requires="a14">
           <p:sp>
             <p:nvSpPr>
               <p:cNvPr id="100" name="Rectangle 99">
@@ -4211,7 +4212,7 @@
             </p:nvSpPr>
             <p:spPr>
               <a:xfrm>
-                <a:off x="9074170" y="8123615"/>
+                <a:off x="8122359" y="8102834"/>
                 <a:ext cx="1882054" cy="425501"/>
               </a:xfrm>
               <a:prstGeom prst="rect">
@@ -4378,7 +4379,7 @@
             </p:txBody>
           </p:sp>
         </mc:Choice>
-        <mc:Fallback xmlns="">
+        <mc:Fallback>
           <p:sp>
             <p:nvSpPr>
               <p:cNvPr id="100" name="Rectangle 99">
@@ -4395,7 +4396,7 @@
             </p:nvSpPr>
             <p:spPr>
               <a:xfrm>
-                <a:off x="9074170" y="8123615"/>
+                <a:off x="8122359" y="8102834"/>
                 <a:ext cx="1882054" cy="425501"/>
               </a:xfrm>
               <a:prstGeom prst="rect">
@@ -4430,8 +4431,8 @@
           </p:sp>
         </mc:Fallback>
       </mc:AlternateContent>
-      <mc:AlternateContent xmlns:mc="http://schemas.openxmlformats.org/markup-compatibility/2006" xmlns:a14="http://schemas.microsoft.com/office/drawing/2010/main">
-        <mc:Choice Requires="a14">
+      <mc:AlternateContent xmlns:mc="http://schemas.openxmlformats.org/markup-compatibility/2006">
+        <mc:Choice xmlns:a14="http://schemas.microsoft.com/office/drawing/2010/main" Requires="a14">
           <p:sp>
             <p:nvSpPr>
               <p:cNvPr id="101" name="TextBox 100">
@@ -4446,7 +4447,7 @@
             </p:nvSpPr>
             <p:spPr>
               <a:xfrm>
-                <a:off x="14822781" y="4201334"/>
+                <a:off x="14053850" y="4180553"/>
                 <a:ext cx="2066593" cy="307777"/>
               </a:xfrm>
               <a:prstGeom prst="rect">
@@ -4524,7 +4525,7 @@
             </p:txBody>
           </p:sp>
         </mc:Choice>
-        <mc:Fallback xmlns="">
+        <mc:Fallback>
           <p:sp>
             <p:nvSpPr>
               <p:cNvPr id="101" name="TextBox 100">
@@ -4541,7 +4542,7 @@
             </p:nvSpPr>
             <p:spPr>
               <a:xfrm>
-                <a:off x="14822781" y="4201334"/>
+                <a:off x="14053850" y="4180553"/>
                 <a:ext cx="2066593" cy="307777"/>
               </a:xfrm>
               <a:prstGeom prst="rect">
@@ -4550,7 +4551,7 @@
               <a:blipFill>
                 <a:blip r:embed="rId5"/>
                 <a:stretch>
-                  <a:fillRect l="-606" t="-3846" b="-15385"/>
+                  <a:fillRect l="-1220" b="-15385"/>
                 </a:stretch>
               </a:blipFill>
               <a:ln>
@@ -4590,7 +4591,7 @@
         </p:nvSpPr>
         <p:spPr>
           <a:xfrm>
-            <a:off x="16034788" y="6095836"/>
+            <a:off x="15265857" y="6097915"/>
             <a:ext cx="1513226" cy="307777"/>
           </a:xfrm>
           <a:prstGeom prst="rect">
@@ -4657,7 +4658,7 @@
         </p:nvSpPr>
         <p:spPr>
           <a:xfrm>
-            <a:off x="7849402" y="6453952"/>
+            <a:off x="7080471" y="6433171"/>
             <a:ext cx="324128" cy="276999"/>
           </a:xfrm>
           <a:prstGeom prst="rect">
@@ -4695,8 +4696,8 @@
         </p:nvSpPr>
         <p:spPr>
           <a:xfrm>
-            <a:off x="12208457" y="2919321"/>
-            <a:ext cx="956785" cy="261610"/>
+            <a:off x="10234173" y="2899020"/>
+            <a:ext cx="1341775" cy="261610"/>
           </a:xfrm>
           <a:prstGeom prst="rect">
             <a:avLst/>
@@ -4723,7 +4724,7 @@
                 <a:ea typeface="Calibri" charset="0"/>
                 <a:cs typeface="Calibri" charset="0"/>
               </a:rPr>
-              <a:t>Voting</a:t>
+              <a:t>Campaigning</a:t>
             </a:r>
           </a:p>
         </p:txBody>
@@ -4742,7 +4743,7 @@
         </p:nvSpPr>
         <p:spPr>
           <a:xfrm>
-            <a:off x="14692329" y="2894165"/>
+            <a:off x="13884599" y="2893987"/>
             <a:ext cx="1439668" cy="261610"/>
           </a:xfrm>
           <a:prstGeom prst="rect">
@@ -4765,18 +4766,13 @@
           <a:p>
             <a:pPr algn="ctr"/>
             <a:r>
-              <a:rPr lang="en-US" sz="1100" b="1" dirty="0" err="1">
+              <a:rPr lang="en-US" sz="1100" b="1" dirty="0">
                 <a:latin typeface="Montserrat" pitchFamily="2" charset="77"/>
                 <a:ea typeface="Calibri" charset="0"/>
                 <a:cs typeface="Calibri" charset="0"/>
               </a:rPr>
-              <a:t>Synchronisation</a:t>
+              <a:t>Synchronization</a:t>
             </a:r>
-            <a:endParaRPr lang="en-US" sz="1100" b="1" dirty="0">
-              <a:latin typeface="Montserrat" pitchFamily="2" charset="77"/>
-              <a:ea typeface="Calibri" charset="0"/>
-              <a:cs typeface="Calibri" charset="0"/>
-            </a:endParaRPr>
           </a:p>
         </p:txBody>
       </p:sp>
@@ -4794,7 +4790,7 @@
         </p:nvSpPr>
         <p:spPr>
           <a:xfrm>
-            <a:off x="11565786" y="6449901"/>
+            <a:off x="10796855" y="6429120"/>
             <a:ext cx="402674" cy="276999"/>
           </a:xfrm>
           <a:prstGeom prst="rect">
@@ -4833,7 +4829,7 @@
         </p:nvSpPr>
         <p:spPr>
           <a:xfrm>
-            <a:off x="15804273" y="6447331"/>
+            <a:off x="15035342" y="6426550"/>
             <a:ext cx="402674" cy="276999"/>
           </a:xfrm>
           <a:prstGeom prst="rect">
@@ -4872,7 +4868,7 @@
         </p:nvCxnSpPr>
         <p:spPr>
           <a:xfrm>
-            <a:off x="11616953" y="6671884"/>
+            <a:off x="10848022" y="6636815"/>
             <a:ext cx="0" cy="97655"/>
           </a:xfrm>
           <a:prstGeom prst="line">
@@ -4915,7 +4911,7 @@
         </p:nvCxnSpPr>
         <p:spPr>
           <a:xfrm flipV="1">
-            <a:off x="16145260" y="6436291"/>
+            <a:off x="15376329" y="6415510"/>
             <a:ext cx="0" cy="216000"/>
           </a:xfrm>
           <a:prstGeom prst="straightConnector1">
@@ -4961,7 +4957,7 @@
         </p:nvCxnSpPr>
         <p:spPr>
           <a:xfrm rot="16200000" flipV="1">
-            <a:off x="6775262" y="5410432"/>
+            <a:off x="6006331" y="5389651"/>
             <a:ext cx="1869755" cy="861604"/>
           </a:xfrm>
           <a:prstGeom prst="bentConnector3">
@@ -5007,7 +5003,7 @@
         </p:nvCxnSpPr>
         <p:spPr>
           <a:xfrm>
-            <a:off x="16145508" y="9514424"/>
+            <a:off x="15376577" y="9493643"/>
             <a:ext cx="1476000" cy="0"/>
           </a:xfrm>
           <a:prstGeom prst="straightConnector1">
@@ -5052,7 +5048,7 @@
         </p:nvCxnSpPr>
         <p:spPr>
           <a:xfrm>
-            <a:off x="5252956" y="9514424"/>
+            <a:off x="4484025" y="9493643"/>
             <a:ext cx="2876934" cy="0"/>
           </a:xfrm>
           <a:prstGeom prst="straightConnector1">
@@ -5083,8 +5079,8 @@
           </a:fontRef>
         </p:style>
       </p:cxnSp>
-      <mc:AlternateContent xmlns:mc="http://schemas.openxmlformats.org/markup-compatibility/2006" xmlns:a14="http://schemas.microsoft.com/office/drawing/2010/main">
-        <mc:Choice Requires="a14">
+      <mc:AlternateContent xmlns:mc="http://schemas.openxmlformats.org/markup-compatibility/2006">
+        <mc:Choice xmlns:a14="http://schemas.microsoft.com/office/drawing/2010/main" Requires="a14">
           <p:sp>
             <p:nvSpPr>
               <p:cNvPr id="113" name="TextBox 112">
@@ -5099,7 +5095,7 @@
             </p:nvSpPr>
             <p:spPr>
               <a:xfrm>
-                <a:off x="11975387" y="4786911"/>
+                <a:off x="11206456" y="4800420"/>
                 <a:ext cx="2245726" cy="755976"/>
               </a:xfrm>
               <a:prstGeom prst="rect">
@@ -5128,7 +5124,7 @@
                     <a:ea typeface="Calibri" charset="0"/>
                     <a:cs typeface="Calibri" charset="0"/>
                   </a:rPr>
-                  <a:t>Computation and broadcast of ledger state update </a:t>
+                  <a:t>Computation and broadcast of votes </a:t>
                 </a:r>
                 <a14:m>
                   <m:oMath xmlns:m="http://schemas.openxmlformats.org/officeDocument/2006/math">
@@ -5197,7 +5193,7 @@
             </p:txBody>
           </p:sp>
         </mc:Choice>
-        <mc:Fallback xmlns="">
+        <mc:Fallback>
           <p:sp>
             <p:nvSpPr>
               <p:cNvPr id="113" name="TextBox 112">
@@ -5214,7 +5210,7 @@
             </p:nvSpPr>
             <p:spPr>
               <a:xfrm>
-                <a:off x="11975387" y="4786911"/>
+                <a:off x="11206456" y="4800420"/>
                 <a:ext cx="2245726" cy="755976"/>
               </a:xfrm>
               <a:prstGeom prst="rect">
@@ -5223,7 +5219,7 @@
               <a:blipFill>
                 <a:blip r:embed="rId6"/>
                 <a:stretch>
-                  <a:fillRect l="-559" t="-1639" b="-6557"/>
+                  <a:fillRect l="-559" b="-4839"/>
                 </a:stretch>
               </a:blipFill>
               <a:ln>
@@ -5263,7 +5259,7 @@
         </p:nvSpPr>
         <p:spPr>
           <a:xfrm rot="16200000">
-            <a:off x="16528326" y="8169240"/>
+            <a:off x="15759395" y="8148459"/>
             <a:ext cx="463325" cy="1723042"/>
           </a:xfrm>
           <a:prstGeom prst="rtTriangle">
@@ -5312,7 +5308,7 @@
         </p:nvSpPr>
         <p:spPr>
           <a:xfrm>
-            <a:off x="6000404" y="2788144"/>
+            <a:off x="5231473" y="2767363"/>
             <a:ext cx="11643360" cy="7118547"/>
           </a:xfrm>
           <a:prstGeom prst="rect">
@@ -5366,7 +5362,7 @@
         </p:nvSpPr>
         <p:spPr>
           <a:xfrm>
-            <a:off x="8493286" y="2910399"/>
+            <a:off x="8055623" y="2893987"/>
             <a:ext cx="1575658" cy="261610"/>
           </a:xfrm>
           <a:prstGeom prst="rect">
@@ -5394,13 +5390,13 @@
                 <a:ea typeface="Calibri" charset="0"/>
                 <a:cs typeface="Calibri" charset="0"/>
               </a:rPr>
-              <a:t>Computation</a:t>
+              <a:t>Production</a:t>
             </a:r>
           </a:p>
         </p:txBody>
       </p:sp>
-      <mc:AlternateContent xmlns:mc="http://schemas.openxmlformats.org/markup-compatibility/2006" xmlns:a14="http://schemas.microsoft.com/office/drawing/2010/main">
-        <mc:Choice Requires="a14">
+      <mc:AlternateContent xmlns:mc="http://schemas.openxmlformats.org/markup-compatibility/2006">
+        <mc:Choice xmlns:a14="http://schemas.microsoft.com/office/drawing/2010/main" Requires="a14">
           <p:sp>
             <p:nvSpPr>
               <p:cNvPr id="117" name="TextBox 116">
@@ -5415,7 +5411,7 @@
             </p:nvSpPr>
             <p:spPr>
               <a:xfrm>
-                <a:off x="8180948" y="3720979"/>
+                <a:off x="7412017" y="3700198"/>
                 <a:ext cx="2406963" cy="1540806"/>
               </a:xfrm>
               <a:prstGeom prst="rect">
@@ -5647,7 +5643,7 @@
             </p:txBody>
           </p:sp>
         </mc:Choice>
-        <mc:Fallback xmlns="">
+        <mc:Fallback>
           <p:sp>
             <p:nvSpPr>
               <p:cNvPr id="117" name="TextBox 116">
@@ -5664,7 +5660,7 @@
             </p:nvSpPr>
             <p:spPr>
               <a:xfrm>
-                <a:off x="8180948" y="3720979"/>
+                <a:off x="7412017" y="3700198"/>
                 <a:ext cx="2406963" cy="1540806"/>
               </a:xfrm>
               <a:prstGeom prst="rect">
@@ -5673,7 +5669,7 @@
               <a:blipFill>
                 <a:blip r:embed="rId7"/>
                 <a:stretch>
-                  <a:fillRect l="-521" b="-2439"/>
+                  <a:fillRect l="-524" b="-1613"/>
                 </a:stretch>
               </a:blipFill>
               <a:ln>
@@ -5713,7 +5709,7 @@
         </p:nvSpPr>
         <p:spPr>
           <a:xfrm rot="16200000">
-            <a:off x="8973656" y="5451342"/>
+            <a:off x="8204725" y="5430561"/>
             <a:ext cx="390293" cy="2039621"/>
           </a:xfrm>
           <a:prstGeom prst="rightBrace">
@@ -5769,7 +5765,7 @@
         </p:nvCxnSpPr>
         <p:spPr>
           <a:xfrm flipH="1" flipV="1">
-            <a:off x="9166564" y="5256463"/>
+            <a:off x="8397633" y="5235682"/>
             <a:ext cx="1" cy="1041243"/>
           </a:xfrm>
           <a:prstGeom prst="straightConnector1">
@@ -5799,8 +5795,8 @@
           </a:fontRef>
         </p:style>
       </p:cxnSp>
-      <mc:AlternateContent xmlns:mc="http://schemas.openxmlformats.org/markup-compatibility/2006" xmlns:a14="http://schemas.microsoft.com/office/drawing/2010/main">
-        <mc:Choice Requires="a14">
+      <mc:AlternateContent xmlns:mc="http://schemas.openxmlformats.org/markup-compatibility/2006">
+        <mc:Choice xmlns:a14="http://schemas.microsoft.com/office/drawing/2010/main" Requires="a14">
           <p:sp>
             <p:nvSpPr>
               <p:cNvPr id="120" name="Rectangle 119">
@@ -5815,7 +5811,7 @@
             </p:nvSpPr>
             <p:spPr>
               <a:xfrm>
-                <a:off x="15000780" y="3826221"/>
+                <a:off x="13842912" y="3781319"/>
                 <a:ext cx="1628843" cy="281879"/>
               </a:xfrm>
               <a:prstGeom prst="rect">
@@ -6082,7 +6078,7 @@
             </p:txBody>
           </p:sp>
         </mc:Choice>
-        <mc:Fallback xmlns="">
+        <mc:Fallback>
           <p:sp>
             <p:nvSpPr>
               <p:cNvPr id="120" name="Rectangle 119">
@@ -6099,7 +6095,7 @@
             </p:nvSpPr>
             <p:spPr>
               <a:xfrm>
-                <a:off x="15000780" y="3826221"/>
+                <a:off x="13842912" y="3781319"/>
                 <a:ext cx="1628843" cy="281879"/>
               </a:xfrm>
               <a:prstGeom prst="rect">
@@ -6148,7 +6144,7 @@
         </p:nvSpPr>
         <p:spPr>
           <a:xfrm>
-            <a:off x="6637487" y="4367725"/>
+            <a:off x="5868556" y="4346944"/>
             <a:ext cx="1426738" cy="523220"/>
           </a:xfrm>
           <a:prstGeom prst="rect">
@@ -6201,7 +6197,7 @@
         </p:nvCxnSpPr>
         <p:spPr>
           <a:xfrm rot="16200000" flipV="1">
-            <a:off x="7570934" y="6172479"/>
+            <a:off x="6802003" y="6151698"/>
             <a:ext cx="838614" cy="299434"/>
           </a:xfrm>
           <a:prstGeom prst="bentConnector2">
@@ -6231,8 +6227,8 @@
           </a:fontRef>
         </p:style>
       </p:cxnSp>
-      <mc:AlternateContent xmlns:mc="http://schemas.openxmlformats.org/markup-compatibility/2006" xmlns:a14="http://schemas.microsoft.com/office/drawing/2010/main">
-        <mc:Choice Requires="a14">
+      <mc:AlternateContent xmlns:mc="http://schemas.openxmlformats.org/markup-compatibility/2006">
+        <mc:Choice xmlns:a14="http://schemas.microsoft.com/office/drawing/2010/main" Requires="a14">
           <p:sp>
             <p:nvSpPr>
               <p:cNvPr id="123" name="TextBox 122">
@@ -6247,7 +6243,7 @@
             </p:nvSpPr>
             <p:spPr>
               <a:xfrm>
-                <a:off x="11072791" y="6827939"/>
+                <a:off x="10303860" y="6807158"/>
                 <a:ext cx="390720" cy="276999"/>
               </a:xfrm>
               <a:prstGeom prst="rect">
@@ -6299,7 +6295,7 @@
                               <a:latin typeface="Cambria Math" panose="02040503050406030204" pitchFamily="18" charset="0"/>
                               <a:ea typeface="Cambria Math" panose="02040503050406030204" pitchFamily="18" charset="0"/>
                             </a:rPr>
-                            <m:t>𝑣</m:t>
+                            <m:t>𝑐</m:t>
                           </m:r>
                           <m:r>
                             <a:rPr lang="en-GB" b="0" i="1" smtClean="0">
@@ -6318,7 +6314,7 @@
             </p:txBody>
           </p:sp>
         </mc:Choice>
-        <mc:Fallback xmlns="">
+        <mc:Fallback>
           <p:sp>
             <p:nvSpPr>
               <p:cNvPr id="123" name="TextBox 122">
@@ -6335,7 +6331,7 @@
             </p:nvSpPr>
             <p:spPr>
               <a:xfrm>
-                <a:off x="11072791" y="6827939"/>
+                <a:off x="10303860" y="6807158"/>
                 <a:ext cx="390720" cy="276999"/>
               </a:xfrm>
               <a:prstGeom prst="rect">
@@ -6344,7 +6340,7 @@
               <a:blipFill>
                 <a:blip r:embed="rId9"/>
                 <a:stretch>
-                  <a:fillRect l="-18750" r="-15625" b="-13636"/>
+                  <a:fillRect l="-18750" r="-15625" b="-13043"/>
                 </a:stretch>
               </a:blipFill>
             </p:spPr>
@@ -6363,8 +6359,8 @@
           </p:sp>
         </mc:Fallback>
       </mc:AlternateContent>
-      <mc:AlternateContent xmlns:mc="http://schemas.openxmlformats.org/markup-compatibility/2006" xmlns:a14="http://schemas.microsoft.com/office/drawing/2010/main">
-        <mc:Choice Requires="a14">
+      <mc:AlternateContent xmlns:mc="http://schemas.openxmlformats.org/markup-compatibility/2006">
+        <mc:Choice xmlns:a14="http://schemas.microsoft.com/office/drawing/2010/main" Requires="a14">
           <p:sp>
             <p:nvSpPr>
               <p:cNvPr id="124" name="TextBox 123">
@@ -6379,7 +6375,7 @@
             </p:nvSpPr>
             <p:spPr>
               <a:xfrm>
-                <a:off x="15518985" y="4797699"/>
+                <a:off x="14498594" y="4799778"/>
                 <a:ext cx="1608764" cy="523220"/>
               </a:xfrm>
               <a:prstGeom prst="rect">
@@ -6471,7 +6467,7 @@
             </p:txBody>
           </p:sp>
         </mc:Choice>
-        <mc:Fallback xmlns="">
+        <mc:Fallback>
           <p:sp>
             <p:nvSpPr>
               <p:cNvPr id="124" name="TextBox 123">
@@ -6488,7 +6484,7 @@
             </p:nvSpPr>
             <p:spPr>
               <a:xfrm>
-                <a:off x="15518985" y="4797699"/>
+                <a:off x="14498594" y="4799778"/>
                 <a:ext cx="1608764" cy="523220"/>
               </a:xfrm>
               <a:prstGeom prst="rect">
@@ -6497,7 +6493,7 @@
               <a:blipFill>
                 <a:blip r:embed="rId10"/>
                 <a:stretch>
-                  <a:fillRect l="-775" t="-2326" b="-9302"/>
+                  <a:fillRect l="-781" b="-9302"/>
                 </a:stretch>
               </a:blipFill>
               <a:ln>
@@ -6523,8 +6519,8 @@
           </p:sp>
         </mc:Fallback>
       </mc:AlternateContent>
-      <mc:AlternateContent xmlns:mc="http://schemas.openxmlformats.org/markup-compatibility/2006" xmlns:a14="http://schemas.microsoft.com/office/drawing/2010/main">
-        <mc:Choice Requires="a14">
+      <mc:AlternateContent xmlns:mc="http://schemas.openxmlformats.org/markup-compatibility/2006">
+        <mc:Choice xmlns:a14="http://schemas.microsoft.com/office/drawing/2010/main" Requires="a14">
           <p:sp>
             <p:nvSpPr>
               <p:cNvPr id="125" name="TextBox 124">
@@ -6539,7 +6535,7 @@
             </p:nvSpPr>
             <p:spPr>
               <a:xfrm>
-                <a:off x="13208928" y="9524343"/>
+                <a:off x="12439997" y="9503562"/>
                 <a:ext cx="390720" cy="298928"/>
               </a:xfrm>
               <a:prstGeom prst="rect">
@@ -6603,7 +6599,7 @@
             </p:txBody>
           </p:sp>
         </mc:Choice>
-        <mc:Fallback xmlns="">
+        <mc:Fallback>
           <p:sp>
             <p:nvSpPr>
               <p:cNvPr id="125" name="TextBox 124">
@@ -6620,7 +6616,7 @@
             </p:nvSpPr>
             <p:spPr>
               <a:xfrm>
-                <a:off x="13208928" y="9524343"/>
+                <a:off x="12439997" y="9503562"/>
                 <a:ext cx="390720" cy="298928"/>
               </a:xfrm>
               <a:prstGeom prst="rect">
@@ -6629,7 +6625,7 @@
               <a:blipFill>
                 <a:blip r:embed="rId11"/>
                 <a:stretch>
-                  <a:fillRect l="-18750" r="-78125" b="-25000"/>
+                  <a:fillRect l="-19355" r="-83871" b="-20000"/>
                 </a:stretch>
               </a:blipFill>
             </p:spPr>
@@ -6648,8 +6644,8 @@
           </p:sp>
         </mc:Fallback>
       </mc:AlternateContent>
-      <mc:AlternateContent xmlns:mc="http://schemas.openxmlformats.org/markup-compatibility/2006" xmlns:a14="http://schemas.microsoft.com/office/drawing/2010/main">
-        <mc:Choice Requires="a14">
+      <mc:AlternateContent xmlns:mc="http://schemas.openxmlformats.org/markup-compatibility/2006">
+        <mc:Choice xmlns:a14="http://schemas.microsoft.com/office/drawing/2010/main" Requires="a14">
           <p:sp>
             <p:nvSpPr>
               <p:cNvPr id="126" name="TextBox 125">
@@ -6664,8 +6660,8 @@
             </p:nvSpPr>
             <p:spPr>
               <a:xfrm>
-                <a:off x="8646377" y="6871344"/>
-                <a:ext cx="390720" cy="276999"/>
+                <a:off x="7877446" y="6850563"/>
+                <a:ext cx="390720" cy="298415"/>
               </a:xfrm>
               <a:prstGeom prst="rect">
                 <a:avLst/>
@@ -6716,7 +6712,7 @@
                               <a:latin typeface="Cambria Math" panose="02040503050406030204" pitchFamily="18" charset="0"/>
                               <a:ea typeface="Cambria Math" panose="02040503050406030204" pitchFamily="18" charset="0"/>
                             </a:rPr>
-                            <m:t>𝑐</m:t>
+                            <m:t>𝑝</m:t>
                           </m:r>
                           <m:r>
                             <a:rPr lang="en-GB" b="0" i="1" smtClean="0">
@@ -6735,7 +6731,7 @@
             </p:txBody>
           </p:sp>
         </mc:Choice>
-        <mc:Fallback xmlns="">
+        <mc:Fallback>
           <p:sp>
             <p:nvSpPr>
               <p:cNvPr id="126" name="TextBox 125">
@@ -6752,8 +6748,8 @@
             </p:nvSpPr>
             <p:spPr>
               <a:xfrm>
-                <a:off x="8646377" y="6871344"/>
-                <a:ext cx="390720" cy="276999"/>
+                <a:off x="7877446" y="6850563"/>
+                <a:ext cx="390720" cy="298415"/>
               </a:xfrm>
               <a:prstGeom prst="rect">
                 <a:avLst/>
@@ -6761,7 +6757,7 @@
               <a:blipFill>
                 <a:blip r:embed="rId12"/>
                 <a:stretch>
-                  <a:fillRect l="-18750" r="-15625" b="-8696"/>
+                  <a:fillRect l="-18750" r="-21875" b="-16000"/>
                 </a:stretch>
               </a:blipFill>
             </p:spPr>
@@ -6796,7 +6792,7 @@
         </p:nvCxnSpPr>
         <p:spPr>
           <a:xfrm>
-            <a:off x="8148992" y="6860911"/>
+            <a:off x="7380061" y="6840130"/>
             <a:ext cx="2033676" cy="0"/>
           </a:xfrm>
           <a:prstGeom prst="straightConnector1">
@@ -6825,8 +6821,8 @@
           </a:fontRef>
         </p:style>
       </p:cxnSp>
-      <mc:AlternateContent xmlns:mc="http://schemas.openxmlformats.org/markup-compatibility/2006" xmlns:a14="http://schemas.microsoft.com/office/drawing/2010/main">
-        <mc:Choice Requires="a14">
+      <mc:AlternateContent xmlns:mc="http://schemas.openxmlformats.org/markup-compatibility/2006">
+        <mc:Choice xmlns:a14="http://schemas.microsoft.com/office/drawing/2010/main" Requires="a14">
           <p:sp>
             <p:nvSpPr>
               <p:cNvPr id="128" name="TextBox 127">
@@ -6841,7 +6837,7 @@
             </p:nvSpPr>
             <p:spPr>
               <a:xfrm>
-                <a:off x="8501002" y="5585918"/>
+                <a:off x="7732071" y="5565137"/>
                 <a:ext cx="2183370" cy="307777"/>
               </a:xfrm>
               <a:prstGeom prst="rect">
@@ -6962,7 +6958,7 @@
             </p:txBody>
           </p:sp>
         </mc:Choice>
-        <mc:Fallback xmlns="">
+        <mc:Fallback>
           <p:sp>
             <p:nvSpPr>
               <p:cNvPr id="128" name="TextBox 127">
@@ -6979,7 +6975,7 @@
             </p:nvSpPr>
             <p:spPr>
               <a:xfrm>
-                <a:off x="8501002" y="5585918"/>
+                <a:off x="7732071" y="5565137"/>
                 <a:ext cx="2183370" cy="307777"/>
               </a:xfrm>
               <a:prstGeom prst="rect">
@@ -6988,7 +6984,7 @@
               <a:blipFill>
                 <a:blip r:embed="rId13"/>
                 <a:stretch>
-                  <a:fillRect l="-575" t="-3846" b="-11538"/>
+                  <a:fillRect l="-575" b="-15385"/>
                 </a:stretch>
               </a:blipFill>
               <a:ln>
@@ -7026,7 +7022,7 @@
         </p:nvSpPr>
         <p:spPr>
           <a:xfrm rot="16200000">
-            <a:off x="9252727" y="5075826"/>
+            <a:off x="8483796" y="5055045"/>
             <a:ext cx="481002" cy="2710459"/>
           </a:xfrm>
           <a:prstGeom prst="rightBrace">
@@ -7080,7 +7076,7 @@
         </p:nvCxnSpPr>
         <p:spPr>
           <a:xfrm flipV="1">
-            <a:off x="9503079" y="5902888"/>
+            <a:off x="8734148" y="5882107"/>
             <a:ext cx="0" cy="303011"/>
           </a:xfrm>
           <a:prstGeom prst="straightConnector1">
@@ -7124,7 +7120,7 @@
         </p:nvCxnSpPr>
         <p:spPr>
           <a:xfrm>
-            <a:off x="8145114" y="7697325"/>
+            <a:off x="7376183" y="7676544"/>
             <a:ext cx="2712770" cy="0"/>
           </a:xfrm>
           <a:prstGeom prst="straightConnector1">
@@ -7153,8 +7149,8 @@
           </a:fontRef>
         </p:style>
       </p:cxnSp>
-      <mc:AlternateContent xmlns:mc="http://schemas.openxmlformats.org/markup-compatibility/2006" xmlns:a14="http://schemas.microsoft.com/office/drawing/2010/main">
-        <mc:Choice Requires="a14">
+      <mc:AlternateContent xmlns:mc="http://schemas.openxmlformats.org/markup-compatibility/2006">
+        <mc:Choice xmlns:a14="http://schemas.microsoft.com/office/drawing/2010/main" Requires="a14">
           <p:sp>
             <p:nvSpPr>
               <p:cNvPr id="132" name="TextBox 131">
@@ -7169,8 +7165,8 @@
             </p:nvSpPr>
             <p:spPr>
               <a:xfrm>
-                <a:off x="9344651" y="7782125"/>
-                <a:ext cx="390720" cy="276999"/>
+                <a:off x="8575720" y="7761344"/>
+                <a:ext cx="390720" cy="298415"/>
               </a:xfrm>
               <a:prstGeom prst="rect">
                 <a:avLst/>
@@ -7221,7 +7217,7 @@
                               <a:latin typeface="Cambria Math" panose="02040503050406030204" pitchFamily="18" charset="0"/>
                               <a:ea typeface="Cambria Math" panose="02040503050406030204" pitchFamily="18" charset="0"/>
                             </a:rPr>
-                            <m:t>𝑐</m:t>
+                            <m:t>𝑝</m:t>
                           </m:r>
                         </m:sub>
                       </m:sSub>
@@ -7233,7 +7229,7 @@
             </p:txBody>
           </p:sp>
         </mc:Choice>
-        <mc:Fallback xmlns="">
+        <mc:Fallback>
           <p:sp>
             <p:nvSpPr>
               <p:cNvPr id="132" name="TextBox 131">
@@ -7250,8 +7246,8 @@
             </p:nvSpPr>
             <p:spPr>
               <a:xfrm>
-                <a:off x="9344651" y="7782125"/>
-                <a:ext cx="390720" cy="276999"/>
+                <a:off x="8575720" y="7761344"/>
+                <a:ext cx="390720" cy="298415"/>
               </a:xfrm>
               <a:prstGeom prst="rect">
                 <a:avLst/>
@@ -7259,7 +7255,7 @@
               <a:blipFill>
                 <a:blip r:embed="rId14"/>
                 <a:stretch>
-                  <a:fillRect l="-9375" b="-4348"/>
+                  <a:fillRect l="-9375" r="-6250" b="-16000"/>
                 </a:stretch>
               </a:blipFill>
             </p:spPr>
@@ -7294,8 +7290,8 @@
         </p:nvCxnSpPr>
         <p:spPr>
           <a:xfrm>
-            <a:off x="10841483" y="7468174"/>
-            <a:ext cx="3822673" cy="0"/>
+            <a:off x="11804548" y="7447393"/>
+            <a:ext cx="1971119" cy="0"/>
           </a:xfrm>
           <a:prstGeom prst="straightConnector1">
             <a:avLst/>
@@ -7340,8 +7336,8 @@
         </p:nvCxnSpPr>
         <p:spPr>
           <a:xfrm rot="5400000">
-            <a:off x="9022086" y="6135475"/>
-            <a:ext cx="4135030" cy="266753"/>
+            <a:off x="8097816" y="6084860"/>
+            <a:ext cx="4137322" cy="324128"/>
           </a:xfrm>
           <a:prstGeom prst="bentConnector2">
             <a:avLst/>
@@ -7384,7 +7380,7 @@
         </p:nvSpPr>
         <p:spPr>
           <a:xfrm rot="16200000">
-            <a:off x="11522611" y="5604499"/>
+            <a:off x="10753680" y="5583718"/>
             <a:ext cx="369741" cy="1731995"/>
           </a:xfrm>
           <a:prstGeom prst="rightBrace">
@@ -7422,8 +7418,8 @@
           </a:p>
         </p:txBody>
       </p:sp>
-      <mc:AlternateContent xmlns:mc="http://schemas.openxmlformats.org/markup-compatibility/2006" xmlns:a14="http://schemas.microsoft.com/office/drawing/2010/main">
-        <mc:Choice Requires="a14">
+      <mc:AlternateContent xmlns:mc="http://schemas.openxmlformats.org/markup-compatibility/2006">
+        <mc:Choice xmlns:a14="http://schemas.microsoft.com/office/drawing/2010/main" Requires="a14">
           <p:sp>
             <p:nvSpPr>
               <p:cNvPr id="136" name="TextBox 135">
@@ -7438,7 +7434,7 @@
             </p:nvSpPr>
             <p:spPr>
               <a:xfrm>
-                <a:off x="12384260" y="7532155"/>
+                <a:off x="12591013" y="7477421"/>
                 <a:ext cx="390720" cy="276999"/>
               </a:xfrm>
               <a:prstGeom prst="rect">
@@ -7502,7 +7498,7 @@
             </p:txBody>
           </p:sp>
         </mc:Choice>
-        <mc:Fallback xmlns="">
+        <mc:Fallback>
           <p:sp>
             <p:nvSpPr>
               <p:cNvPr id="136" name="TextBox 135">
@@ -7519,7 +7515,7 @@
             </p:nvSpPr>
             <p:spPr>
               <a:xfrm>
-                <a:off x="12384260" y="7532155"/>
+                <a:off x="12591013" y="7477421"/>
                 <a:ext cx="390720" cy="276999"/>
               </a:xfrm>
               <a:prstGeom prst="rect">
@@ -7561,7 +7557,7 @@
         </p:nvSpPr>
         <p:spPr>
           <a:xfrm rot="16200000">
-            <a:off x="13034557" y="5726413"/>
+            <a:off x="12265626" y="5705632"/>
             <a:ext cx="471262" cy="1388188"/>
           </a:xfrm>
           <a:prstGeom prst="rightBrace">
@@ -7617,7 +7613,7 @@
         </p:nvCxnSpPr>
         <p:spPr>
           <a:xfrm>
-            <a:off x="10864289" y="6742946"/>
+            <a:off x="10095358" y="6722165"/>
             <a:ext cx="701497" cy="0"/>
           </a:xfrm>
           <a:prstGeom prst="straightConnector1">
@@ -7662,7 +7658,7 @@
         </p:nvCxnSpPr>
         <p:spPr>
           <a:xfrm>
-            <a:off x="12560505" y="6843511"/>
+            <a:off x="11791574" y="6822730"/>
             <a:ext cx="1388787" cy="0"/>
           </a:xfrm>
           <a:prstGeom prst="straightConnector1">
@@ -7691,8 +7687,8 @@
           </a:fontRef>
         </p:style>
       </p:cxnSp>
-      <mc:AlternateContent xmlns:mc="http://schemas.openxmlformats.org/markup-compatibility/2006" xmlns:a14="http://schemas.microsoft.com/office/drawing/2010/main">
-        <mc:Choice Requires="a14">
+      <mc:AlternateContent xmlns:mc="http://schemas.openxmlformats.org/markup-compatibility/2006">
+        <mc:Choice xmlns:a14="http://schemas.microsoft.com/office/drawing/2010/main" Requires="a14">
           <p:sp>
             <p:nvSpPr>
               <p:cNvPr id="140" name="TextBox 139">
@@ -7707,7 +7703,7 @@
             </p:nvSpPr>
             <p:spPr>
               <a:xfrm>
-                <a:off x="13293129" y="6850276"/>
+                <a:off x="12524198" y="6829495"/>
                 <a:ext cx="390720" cy="276999"/>
               </a:xfrm>
               <a:prstGeom prst="rect">
@@ -7766,7 +7762,7 @@
                               <a:latin typeface="Cambria Math" panose="02040503050406030204" pitchFamily="18" charset="0"/>
                               <a:ea typeface="Cambria Math" panose="02040503050406030204" pitchFamily="18" charset="0"/>
                             </a:rPr>
-                            <m:t>2</m:t>
+                            <m:t>0</m:t>
                           </m:r>
                         </m:sub>
                       </m:sSub>
@@ -7778,7 +7774,7 @@
             </p:txBody>
           </p:sp>
         </mc:Choice>
-        <mc:Fallback xmlns="">
+        <mc:Fallback>
           <p:sp>
             <p:nvSpPr>
               <p:cNvPr id="140" name="TextBox 139">
@@ -7795,7 +7791,7 @@
             </p:nvSpPr>
             <p:spPr>
               <a:xfrm>
-                <a:off x="13293129" y="6850276"/>
+                <a:off x="12524198" y="6829495"/>
                 <a:ext cx="390720" cy="276999"/>
               </a:xfrm>
               <a:prstGeom prst="rect">
@@ -7804,7 +7800,7 @@
               <a:blipFill>
                 <a:blip r:embed="rId16"/>
                 <a:stretch>
-                  <a:fillRect l="-19355" r="-19355" b="-13043"/>
+                  <a:fillRect l="-18750" r="-15625" b="-8696"/>
                 </a:stretch>
               </a:blipFill>
             </p:spPr>
@@ -7837,8 +7833,8 @@
         </p:nvSpPr>
         <p:spPr>
           <a:xfrm rot="16200000">
-            <a:off x="14870984" y="6052496"/>
-            <a:ext cx="471262" cy="747379"/>
+            <a:off x="14013606" y="5931837"/>
+            <a:ext cx="471262" cy="947135"/>
           </a:xfrm>
           <a:prstGeom prst="rightBrace">
             <a:avLst>
@@ -7893,7 +7889,7 @@
         </p:nvCxnSpPr>
         <p:spPr>
           <a:xfrm>
-            <a:off x="7864392" y="8462169"/>
+            <a:off x="7095461" y="8441388"/>
             <a:ext cx="294776" cy="0"/>
           </a:xfrm>
           <a:prstGeom prst="straightConnector1">
@@ -7922,8 +7918,8 @@
           </a:fontRef>
         </p:style>
       </p:cxnSp>
-      <mc:AlternateContent xmlns:mc="http://schemas.openxmlformats.org/markup-compatibility/2006" xmlns:a14="http://schemas.microsoft.com/office/drawing/2010/main">
-        <mc:Choice Requires="a14">
+      <mc:AlternateContent xmlns:mc="http://schemas.openxmlformats.org/markup-compatibility/2006">
+        <mc:Choice xmlns:a14="http://schemas.microsoft.com/office/drawing/2010/main" Requires="a14">
           <p:sp>
             <p:nvSpPr>
               <p:cNvPr id="143" name="TextBox 142">
@@ -7938,7 +7934,7 @@
             </p:nvSpPr>
             <p:spPr>
               <a:xfrm>
-                <a:off x="7895779" y="8493178"/>
+                <a:off x="7126848" y="8472397"/>
                 <a:ext cx="390720" cy="299249"/>
               </a:xfrm>
               <a:prstGeom prst="rect">
@@ -8002,7 +7998,7 @@
             </p:txBody>
           </p:sp>
         </mc:Choice>
-        <mc:Fallback xmlns="">
+        <mc:Fallback>
           <p:sp>
             <p:nvSpPr>
               <p:cNvPr id="143" name="TextBox 142">
@@ -8019,7 +8015,7 @@
             </p:nvSpPr>
             <p:spPr>
               <a:xfrm>
-                <a:off x="7895779" y="8493178"/>
+                <a:off x="7126848" y="8472397"/>
                 <a:ext cx="390720" cy="299249"/>
               </a:xfrm>
               <a:prstGeom prst="rect">
@@ -8028,7 +8024,7 @@
               <a:blipFill>
                 <a:blip r:embed="rId17"/>
                 <a:stretch>
-                  <a:fillRect l="-19355" r="-112903" b="-25000"/>
+                  <a:fillRect l="-18750" r="-109375" b="-20000"/>
                 </a:stretch>
               </a:blipFill>
             </p:spPr>
@@ -8047,8 +8043,8 @@
           </p:sp>
         </mc:Fallback>
       </mc:AlternateContent>
-      <mc:AlternateContent xmlns:mc="http://schemas.openxmlformats.org/markup-compatibility/2006" xmlns:a14="http://schemas.microsoft.com/office/drawing/2010/main">
-        <mc:Choice Requires="a14">
+      <mc:AlternateContent xmlns:mc="http://schemas.openxmlformats.org/markup-compatibility/2006">
+        <mc:Choice xmlns:a14="http://schemas.microsoft.com/office/drawing/2010/main" Requires="a14">
           <p:sp>
             <p:nvSpPr>
               <p:cNvPr id="144" name="Rectangle 143">
@@ -8063,7 +8059,7 @@
             </p:nvSpPr>
             <p:spPr>
               <a:xfrm>
-                <a:off x="9165700" y="4139276"/>
+                <a:off x="8396769" y="4118495"/>
                 <a:ext cx="475515" cy="325089"/>
               </a:xfrm>
               <a:prstGeom prst="rect">
@@ -8130,7 +8126,7 @@
             </p:txBody>
           </p:sp>
         </mc:Choice>
-        <mc:Fallback xmlns="">
+        <mc:Fallback>
           <p:sp>
             <p:nvSpPr>
               <p:cNvPr id="144" name="Rectangle 143">
@@ -8147,7 +8143,7 @@
             </p:nvSpPr>
             <p:spPr>
               <a:xfrm>
-                <a:off x="9165700" y="4139276"/>
+                <a:off x="8396769" y="4118495"/>
                 <a:ext cx="475515" cy="325089"/>
               </a:xfrm>
               <a:prstGeom prst="rect">
@@ -8189,7 +8185,7 @@
         </p:nvSpPr>
         <p:spPr>
           <a:xfrm rot="5400000">
-            <a:off x="9262792" y="3772246"/>
+            <a:off x="8493861" y="3751465"/>
             <a:ext cx="135688" cy="651977"/>
           </a:xfrm>
           <a:prstGeom prst="rightBrace">
@@ -8241,7 +8237,7 @@
         </p:nvSpPr>
         <p:spPr>
           <a:xfrm rot="16200000">
-            <a:off x="10981992" y="6051077"/>
+            <a:off x="10213061" y="6030296"/>
             <a:ext cx="471262" cy="747379"/>
           </a:xfrm>
           <a:prstGeom prst="rightBrace">
@@ -8295,8 +8291,8 @@
         </p:nvSpPr>
         <p:spPr>
           <a:xfrm>
-            <a:off x="13390092" y="5597427"/>
-            <a:ext cx="1575996" cy="523220"/>
+            <a:off x="12575541" y="5725592"/>
+            <a:ext cx="1418353" cy="307777"/>
           </a:xfrm>
           <a:prstGeom prst="rect">
             <a:avLst/>
@@ -8322,21 +8318,8 @@
                 <a:ea typeface="Calibri" charset="0"/>
                 <a:cs typeface="Calibri" panose="020F0502020204030204" pitchFamily="34" charset="0"/>
               </a:rPr>
-              <a:t>Collection of individual </a:t>
+              <a:t>Votes collection</a:t>
             </a:r>
-            <a:r>
-              <a:rPr lang="en-GB" sz="1400" dirty="0">
-                <a:latin typeface="Calibri" panose="020F0502020204030204" pitchFamily="34" charset="0"/>
-                <a:ea typeface="Calibri" charset="0"/>
-                <a:cs typeface="Calibri" panose="020F0502020204030204" pitchFamily="34" charset="0"/>
-              </a:rPr>
-              <a:t>updates</a:t>
-            </a:r>
-            <a:endParaRPr lang="en-US" sz="1400" dirty="0">
-              <a:latin typeface="Calibri" panose="020F0502020204030204" pitchFamily="34" charset="0"/>
-              <a:ea typeface="Calibri" charset="0"/>
-              <a:cs typeface="Calibri" panose="020F0502020204030204" pitchFamily="34" charset="0"/>
-            </a:endParaRPr>
           </a:p>
         </p:txBody>
       </p:sp>
@@ -8354,8 +8337,8 @@
         </p:nvSpPr>
         <p:spPr>
           <a:xfrm rot="16200000">
-            <a:off x="13464976" y="5422121"/>
-            <a:ext cx="369741" cy="2101930"/>
+            <a:off x="12610806" y="5461179"/>
+            <a:ext cx="358608" cy="1971120"/>
           </a:xfrm>
           <a:prstGeom prst="rightBrace">
             <a:avLst>
@@ -8401,13 +8384,15 @@
               </a:ext>
             </a:extLst>
           </p:cNvPr>
-          <p:cNvCxnSpPr/>
+          <p:cNvCxnSpPr>
+            <a:cxnSpLocks/>
+          </p:cNvCxnSpPr>
           <p:nvPr/>
         </p:nvCxnSpPr>
         <p:spPr>
           <a:xfrm flipV="1">
-            <a:off x="13638879" y="6146368"/>
-            <a:ext cx="0" cy="170248"/>
+            <a:off x="12802578" y="6044799"/>
+            <a:ext cx="0" cy="215849"/>
           </a:xfrm>
           <a:prstGeom prst="straightConnector1">
             <a:avLst/>
@@ -8434,8 +8419,8 @@
           </a:fontRef>
         </p:style>
       </p:cxnSp>
-      <mc:AlternateContent xmlns:mc="http://schemas.openxmlformats.org/markup-compatibility/2006" xmlns:a14="http://schemas.microsoft.com/office/drawing/2010/main">
-        <mc:Choice Requires="a14">
+      <mc:AlternateContent xmlns:mc="http://schemas.openxmlformats.org/markup-compatibility/2006">
+        <mc:Choice xmlns:a14="http://schemas.microsoft.com/office/drawing/2010/main" Requires="a14">
           <p:sp>
             <p:nvSpPr>
               <p:cNvPr id="150" name="TextBox 149">
@@ -8450,7 +8435,7 @@
             </p:nvSpPr>
             <p:spPr>
               <a:xfrm>
-                <a:off x="14882703" y="6769539"/>
+                <a:off x="14113772" y="6748758"/>
                 <a:ext cx="390720" cy="276999"/>
               </a:xfrm>
               <a:prstGeom prst="rect">
@@ -8521,7 +8506,7 @@
             </p:txBody>
           </p:sp>
         </mc:Choice>
-        <mc:Fallback xmlns="">
+        <mc:Fallback>
           <p:sp>
             <p:nvSpPr>
               <p:cNvPr id="150" name="TextBox 149">
@@ -8538,7 +8523,7 @@
             </p:nvSpPr>
             <p:spPr>
               <a:xfrm>
-                <a:off x="14882703" y="6769539"/>
+                <a:off x="14113772" y="6748758"/>
                 <a:ext cx="390720" cy="276999"/>
               </a:xfrm>
               <a:prstGeom prst="rect">
@@ -8547,7 +8532,7 @@
               <a:blipFill>
                 <a:blip r:embed="rId19"/>
                 <a:stretch>
-                  <a:fillRect l="-18750" r="-12500" b="-8696"/>
+                  <a:fillRect l="-18750" r="-15625" b="-13043"/>
                 </a:stretch>
               </a:blipFill>
             </p:spPr>
@@ -8582,8 +8567,8 @@
         </p:nvCxnSpPr>
         <p:spPr>
           <a:xfrm>
-            <a:off x="14697531" y="6776112"/>
-            <a:ext cx="701497" cy="0"/>
+            <a:off x="13775667" y="6755331"/>
+            <a:ext cx="854430" cy="0"/>
           </a:xfrm>
           <a:prstGeom prst="straightConnector1">
             <a:avLst/>
@@ -8627,7 +8612,7 @@
         </p:nvCxnSpPr>
         <p:spPr>
           <a:xfrm flipH="1" flipV="1">
-            <a:off x="15106616" y="4531973"/>
+            <a:off x="14246245" y="4511192"/>
             <a:ext cx="1" cy="1678424"/>
           </a:xfrm>
           <a:prstGeom prst="straightConnector1">
@@ -8673,7 +8658,7 @@
         </p:nvCxnSpPr>
         <p:spPr>
           <a:xfrm flipH="1" flipV="1">
-            <a:off x="15736423" y="5329075"/>
+            <a:off x="14967492" y="5329076"/>
             <a:ext cx="1" cy="1320711"/>
           </a:xfrm>
           <a:prstGeom prst="straightConnector1">
@@ -8719,8 +8704,8 @@
         </p:nvCxnSpPr>
         <p:spPr>
           <a:xfrm>
-            <a:off x="14664156" y="7171327"/>
-            <a:ext cx="1481104" cy="0"/>
+            <a:off x="13775667" y="7150546"/>
+            <a:ext cx="1600662" cy="0"/>
           </a:xfrm>
           <a:prstGeom prst="straightConnector1">
             <a:avLst/>
@@ -8748,8 +8733,8 @@
           </a:fontRef>
         </p:style>
       </p:cxnSp>
-      <mc:AlternateContent xmlns:mc="http://schemas.openxmlformats.org/markup-compatibility/2006" xmlns:a14="http://schemas.microsoft.com/office/drawing/2010/main">
-        <mc:Choice Requires="a14">
+      <mc:AlternateContent xmlns:mc="http://schemas.openxmlformats.org/markup-compatibility/2006">
+        <mc:Choice xmlns:a14="http://schemas.microsoft.com/office/drawing/2010/main" Requires="a14">
           <p:sp>
             <p:nvSpPr>
               <p:cNvPr id="155" name="TextBox 154">
@@ -8764,7 +8749,7 @@
             </p:nvSpPr>
             <p:spPr>
               <a:xfrm flipH="1">
-                <a:off x="15189204" y="7191207"/>
+                <a:off x="14420273" y="7170426"/>
                 <a:ext cx="474123" cy="276999"/>
               </a:xfrm>
               <a:prstGeom prst="rect">
@@ -8828,7 +8813,7 @@
             </p:txBody>
           </p:sp>
         </mc:Choice>
-        <mc:Fallback xmlns="">
+        <mc:Fallback>
           <p:sp>
             <p:nvSpPr>
               <p:cNvPr id="155" name="TextBox 154">
@@ -8845,7 +8830,7 @@
             </p:nvSpPr>
             <p:spPr>
               <a:xfrm flipH="1">
-                <a:off x="15189204" y="7191207"/>
+                <a:off x="14420273" y="7170426"/>
                 <a:ext cx="474123" cy="276999"/>
               </a:xfrm>
               <a:prstGeom prst="rect">
@@ -8854,7 +8839,7 @@
               <a:blipFill>
                 <a:blip r:embed="rId20"/>
                 <a:stretch>
-                  <a:fillRect b="-4348"/>
+                  <a:fillRect b="-9091"/>
                 </a:stretch>
               </a:blipFill>
             </p:spPr>
@@ -8889,7 +8874,7 @@
         </p:nvCxnSpPr>
         <p:spPr>
           <a:xfrm>
-            <a:off x="10841483" y="7119118"/>
+            <a:off x="10072552" y="7098337"/>
             <a:ext cx="1719022" cy="0"/>
           </a:xfrm>
           <a:prstGeom prst="straightConnector1">
@@ -8918,8 +8903,8 @@
           </a:fontRef>
         </p:style>
       </p:cxnSp>
-      <mc:AlternateContent xmlns:mc="http://schemas.openxmlformats.org/markup-compatibility/2006" xmlns:a14="http://schemas.microsoft.com/office/drawing/2010/main">
-        <mc:Choice Requires="a14">
+      <mc:AlternateContent xmlns:mc="http://schemas.openxmlformats.org/markup-compatibility/2006">
+        <mc:Choice xmlns:a14="http://schemas.microsoft.com/office/drawing/2010/main" Requires="a14">
           <p:sp>
             <p:nvSpPr>
               <p:cNvPr id="157" name="TextBox 156">
@@ -8934,7 +8919,7 @@
             </p:nvSpPr>
             <p:spPr>
               <a:xfrm>
-                <a:off x="11779891" y="7115144"/>
+                <a:off x="11010960" y="7094363"/>
                 <a:ext cx="390720" cy="276999"/>
               </a:xfrm>
               <a:prstGeom prst="rect">
@@ -8986,14 +8971,7 @@
                               <a:latin typeface="Cambria Math" panose="02040503050406030204" pitchFamily="18" charset="0"/>
                               <a:ea typeface="Cambria Math" panose="02040503050406030204" pitchFamily="18" charset="0"/>
                             </a:rPr>
-                            <m:t>𝑣</m:t>
-                          </m:r>
-                          <m:r>
-                            <a:rPr lang="en-GB" b="0" i="1" smtClean="0">
-                              <a:latin typeface="Cambria Math" panose="02040503050406030204" pitchFamily="18" charset="0"/>
-                              <a:ea typeface="Cambria Math" panose="02040503050406030204" pitchFamily="18" charset="0"/>
-                            </a:rPr>
-                            <m:t>1</m:t>
+                            <m:t>𝑐</m:t>
                           </m:r>
                         </m:sub>
                       </m:sSub>
@@ -9005,7 +8983,7 @@
             </p:txBody>
           </p:sp>
         </mc:Choice>
-        <mc:Fallback xmlns="">
+        <mc:Fallback>
           <p:sp>
             <p:nvSpPr>
               <p:cNvPr id="157" name="TextBox 156">
@@ -9022,7 +9000,7 @@
             </p:nvSpPr>
             <p:spPr>
               <a:xfrm>
-                <a:off x="11779891" y="7115144"/>
+                <a:off x="11010960" y="7094363"/>
                 <a:ext cx="390720" cy="276999"/>
               </a:xfrm>
               <a:prstGeom prst="rect">
@@ -9031,7 +9009,7 @@
               <a:blipFill>
                 <a:blip r:embed="rId21"/>
                 <a:stretch>
-                  <a:fillRect l="-19355" r="-19355" b="-13043"/>
+                  <a:fillRect l="-9375" b="-9091"/>
                 </a:stretch>
               </a:blipFill>
             </p:spPr>
@@ -9085,6 +9063,140 @@
           </a:p>
         </p:txBody>
       </p:sp>
+      <p:sp>
+        <p:nvSpPr>
+          <p:cNvPr id="80" name="TextBox 79">
+            <a:extLst>
+              <a:ext uri="{FF2B5EF4-FFF2-40B4-BE49-F238E27FC236}">
+                <a16:creationId xmlns:a16="http://schemas.microsoft.com/office/drawing/2014/main" id="{892EBB1B-9EBB-C541-A30E-CBB00DACF83A}"/>
+              </a:ext>
+            </a:extLst>
+          </p:cNvPr>
+          <p:cNvSpPr txBox="1"/>
+          <p:nvPr/>
+        </p:nvSpPr>
+        <p:spPr>
+          <a:xfrm>
+            <a:off x="12485967" y="2899020"/>
+            <a:ext cx="956785" cy="261610"/>
+          </a:xfrm>
+          <a:prstGeom prst="rect">
+            <a:avLst/>
+          </a:prstGeom>
+          <a:solidFill>
+            <a:srgbClr val="FFFBFE"/>
+          </a:solidFill>
+          <a:ln>
+            <a:solidFill>
+              <a:schemeClr val="tx1"/>
+            </a:solidFill>
+          </a:ln>
+        </p:spPr>
+        <p:txBody>
+          <a:bodyPr wrap="square" rtlCol="0">
+            <a:spAutoFit/>
+          </a:bodyPr>
+          <a:lstStyle/>
+          <a:p>
+            <a:pPr algn="ctr"/>
+            <a:r>
+              <a:rPr lang="en-US" sz="1100" b="1" dirty="0">
+                <a:latin typeface="Montserrat" pitchFamily="2" charset="77"/>
+                <a:ea typeface="Calibri" charset="0"/>
+                <a:cs typeface="Calibri" charset="0"/>
+              </a:rPr>
+              <a:t>Voting</a:t>
+            </a:r>
+          </a:p>
+        </p:txBody>
+      </p:sp>
+      <p:cxnSp>
+        <p:nvCxnSpPr>
+          <p:cNvPr id="158" name="Straight Connector 157">
+            <a:extLst>
+              <a:ext uri="{FF2B5EF4-FFF2-40B4-BE49-F238E27FC236}">
+                <a16:creationId xmlns:a16="http://schemas.microsoft.com/office/drawing/2014/main" id="{36017A97-83BB-7342-9E64-FDF296A23FCB}"/>
+              </a:ext>
+            </a:extLst>
+          </p:cNvPr>
+          <p:cNvCxnSpPr/>
+          <p:nvPr/>
+        </p:nvCxnSpPr>
+        <p:spPr>
+          <a:xfrm>
+            <a:off x="15377162" y="6635795"/>
+            <a:ext cx="0" cy="97655"/>
+          </a:xfrm>
+          <a:prstGeom prst="line">
+            <a:avLst/>
+          </a:prstGeom>
+          <a:ln>
+            <a:solidFill>
+              <a:schemeClr val="tx1"/>
+            </a:solidFill>
+          </a:ln>
+        </p:spPr>
+        <p:style>
+          <a:lnRef idx="1">
+            <a:schemeClr val="accent1"/>
+          </a:lnRef>
+          <a:fillRef idx="0">
+            <a:schemeClr val="accent1"/>
+          </a:fillRef>
+          <a:effectRef idx="0">
+            <a:schemeClr val="accent1"/>
+          </a:effectRef>
+          <a:fontRef idx="minor">
+            <a:schemeClr val="tx1"/>
+          </a:fontRef>
+        </p:style>
+      </p:cxnSp>
+      <p:cxnSp>
+        <p:nvCxnSpPr>
+          <p:cNvPr id="10" name="Straight Arrow Connector 9">
+            <a:extLst>
+              <a:ext uri="{FF2B5EF4-FFF2-40B4-BE49-F238E27FC236}">
+                <a16:creationId xmlns:a16="http://schemas.microsoft.com/office/drawing/2014/main" id="{B841E496-1692-F448-B053-8E3C8E7F8D9D}"/>
+              </a:ext>
+            </a:extLst>
+          </p:cNvPr>
+          <p:cNvCxnSpPr>
+            <a:stCxn id="146" idx="1"/>
+          </p:cNvCxnSpPr>
+          <p:nvPr/>
+        </p:nvCxnSpPr>
+        <p:spPr>
+          <a:xfrm flipV="1">
+            <a:off x="10448693" y="4178261"/>
+            <a:ext cx="0" cy="1990094"/>
+          </a:xfrm>
+          <a:prstGeom prst="straightConnector1">
+            <a:avLst/>
+          </a:prstGeom>
+          <a:ln>
+            <a:solidFill>
+              <a:schemeClr val="accent6">
+                <a:lumMod val="50000"/>
+              </a:schemeClr>
+            </a:solidFill>
+            <a:tailEnd type="triangle"/>
+          </a:ln>
+        </p:spPr>
+        <p:style>
+          <a:lnRef idx="1">
+            <a:schemeClr val="accent1"/>
+          </a:lnRef>
+          <a:fillRef idx="0">
+            <a:schemeClr val="accent1"/>
+          </a:fillRef>
+          <a:effectRef idx="0">
+            <a:schemeClr val="accent1"/>
+          </a:effectRef>
+          <a:fontRef idx="minor">
+            <a:schemeClr val="tx1"/>
+          </a:fontRef>
+        </p:style>
+      </p:cxnSp>
     </p:spTree>
     <p:extLst>
       <p:ext uri="{BB962C8B-B14F-4D97-AF65-F5344CB8AC3E}">
@@ -15088,6 +15200,65 @@
 </p:sld>
 </file>
 
+<file path=ppt/slides/slide3.xml><?xml version="1.0" encoding="utf-8"?>
+<p:sld xmlns:a="http://schemas.openxmlformats.org/drawingml/2006/main" xmlns:r="http://schemas.openxmlformats.org/officeDocument/2006/relationships" xmlns:p="http://schemas.openxmlformats.org/presentationml/2006/main">
+  <p:cSld>
+    <p:spTree>
+      <p:nvGrpSpPr>
+        <p:cNvPr id="1" name=""/>
+        <p:cNvGrpSpPr/>
+        <p:nvPr/>
+      </p:nvGrpSpPr>
+      <p:grpSpPr>
+        <a:xfrm>
+          <a:off x="0" y="0"/>
+          <a:ext cx="0" cy="0"/>
+          <a:chOff x="0" y="0"/>
+          <a:chExt cx="0" cy="0"/>
+        </a:xfrm>
+      </p:grpSpPr>
+      <p:pic>
+        <p:nvPicPr>
+          <p:cNvPr id="9" name="Picture 8" descr="A screenshot of a social media post&#10;&#10;Description automatically generated">
+            <a:extLst>
+              <a:ext uri="{FF2B5EF4-FFF2-40B4-BE49-F238E27FC236}">
+                <a16:creationId xmlns:a16="http://schemas.microsoft.com/office/drawing/2014/main" id="{610C2F64-4AEE-2B43-BA4F-CAF1162F87D9}"/>
+              </a:ext>
+            </a:extLst>
+          </p:cNvPr>
+          <p:cNvPicPr>
+            <a:picLocks noChangeAspect="1"/>
+          </p:cNvPicPr>
+          <p:nvPr/>
+        </p:nvPicPr>
+        <p:blipFill rotWithShape="1">
+          <a:blip r:embed="rId2"/>
+          <a:srcRect l="30706" t="1131" r="522" b="867"/>
+          <a:stretch/>
+        </p:blipFill>
+        <p:spPr>
+          <a:xfrm>
+            <a:off x="6743700" y="3528290"/>
+            <a:ext cx="11424227" cy="7019637"/>
+          </a:xfrm>
+          <a:prstGeom prst="rect">
+            <a:avLst/>
+          </a:prstGeom>
+        </p:spPr>
+      </p:pic>
+    </p:spTree>
+    <p:extLst>
+      <p:ext uri="{BB962C8B-B14F-4D97-AF65-F5344CB8AC3E}">
+        <p14:creationId xmlns:p14="http://schemas.microsoft.com/office/powerpoint/2010/main" val="806222106"/>
+      </p:ext>
+    </p:extLst>
+  </p:cSld>
+  <p:clrMapOvr>
+    <a:masterClrMapping/>
+  </p:clrMapOvr>
+</p:sld>
+</file>
+
 <file path=ppt/theme/theme1.xml><?xml version="1.0" encoding="utf-8"?>
 <a:theme xmlns:a="http://schemas.openxmlformats.org/drawingml/2006/main" name="Office Theme">
   <a:themeElements>

</xml_diff>

<commit_message>
- Added section around consensus security II (text + graphs) - Added abstract - New references in bibliography - Updated terminology for consensus protocol
</commit_message>
<xml_diff>
--- a/figures/Powerpoint/DesginConsensusAndDatabase.pptx
+++ b/figures/Powerpoint/DesginConsensusAndDatabase.pptx
@@ -245,7 +245,7 @@
           <a:p>
             <a:fld id="{96B47601-FABF-AE48-BF83-19DCD761097A}" type="datetimeFigureOut">
               <a:rPr lang="en-US" smtClean="0"/>
-              <a:t>5/31/19</a:t>
+              <a:t>6/4/19</a:t>
             </a:fld>
             <a:endParaRPr lang="en-US"/>
           </a:p>
@@ -415,7 +415,7 @@
           <a:p>
             <a:fld id="{96B47601-FABF-AE48-BF83-19DCD761097A}" type="datetimeFigureOut">
               <a:rPr lang="en-US" smtClean="0"/>
-              <a:t>5/31/19</a:t>
+              <a:t>6/4/19</a:t>
             </a:fld>
             <a:endParaRPr lang="en-US"/>
           </a:p>
@@ -595,7 +595,7 @@
           <a:p>
             <a:fld id="{96B47601-FABF-AE48-BF83-19DCD761097A}" type="datetimeFigureOut">
               <a:rPr lang="en-US" smtClean="0"/>
-              <a:t>5/31/19</a:t>
+              <a:t>6/4/19</a:t>
             </a:fld>
             <a:endParaRPr lang="en-US"/>
           </a:p>
@@ -765,7 +765,7 @@
           <a:p>
             <a:fld id="{96B47601-FABF-AE48-BF83-19DCD761097A}" type="datetimeFigureOut">
               <a:rPr lang="en-US" smtClean="0"/>
-              <a:t>5/31/19</a:t>
+              <a:t>6/4/19</a:t>
             </a:fld>
             <a:endParaRPr lang="en-US"/>
           </a:p>
@@ -1009,7 +1009,7 @@
           <a:p>
             <a:fld id="{96B47601-FABF-AE48-BF83-19DCD761097A}" type="datetimeFigureOut">
               <a:rPr lang="en-US" smtClean="0"/>
-              <a:t>5/31/19</a:t>
+              <a:t>6/4/19</a:t>
             </a:fld>
             <a:endParaRPr lang="en-US"/>
           </a:p>
@@ -1241,7 +1241,7 @@
           <a:p>
             <a:fld id="{96B47601-FABF-AE48-BF83-19DCD761097A}" type="datetimeFigureOut">
               <a:rPr lang="en-US" smtClean="0"/>
-              <a:t>5/31/19</a:t>
+              <a:t>6/4/19</a:t>
             </a:fld>
             <a:endParaRPr lang="en-US"/>
           </a:p>
@@ -1608,7 +1608,7 @@
           <a:p>
             <a:fld id="{96B47601-FABF-AE48-BF83-19DCD761097A}" type="datetimeFigureOut">
               <a:rPr lang="en-US" smtClean="0"/>
-              <a:t>5/31/19</a:t>
+              <a:t>6/4/19</a:t>
             </a:fld>
             <a:endParaRPr lang="en-US"/>
           </a:p>
@@ -1726,7 +1726,7 @@
           <a:p>
             <a:fld id="{96B47601-FABF-AE48-BF83-19DCD761097A}" type="datetimeFigureOut">
               <a:rPr lang="en-US" smtClean="0"/>
-              <a:t>5/31/19</a:t>
+              <a:t>6/4/19</a:t>
             </a:fld>
             <a:endParaRPr lang="en-US"/>
           </a:p>
@@ -1821,7 +1821,7 @@
           <a:p>
             <a:fld id="{96B47601-FABF-AE48-BF83-19DCD761097A}" type="datetimeFigureOut">
               <a:rPr lang="en-US" smtClean="0"/>
-              <a:t>5/31/19</a:t>
+              <a:t>6/4/19</a:t>
             </a:fld>
             <a:endParaRPr lang="en-US"/>
           </a:p>
@@ -2098,7 +2098,7 @@
           <a:p>
             <a:fld id="{96B47601-FABF-AE48-BF83-19DCD761097A}" type="datetimeFigureOut">
               <a:rPr lang="en-US" smtClean="0"/>
-              <a:t>5/31/19</a:t>
+              <a:t>6/4/19</a:t>
             </a:fld>
             <a:endParaRPr lang="en-US"/>
           </a:p>
@@ -2355,7 +2355,7 @@
           <a:p>
             <a:fld id="{96B47601-FABF-AE48-BF83-19DCD761097A}" type="datetimeFigureOut">
               <a:rPr lang="en-US" smtClean="0"/>
-              <a:t>5/31/19</a:t>
+              <a:t>6/4/19</a:t>
             </a:fld>
             <a:endParaRPr lang="en-US"/>
           </a:p>
@@ -2568,7 +2568,7 @@
           <a:p>
             <a:fld id="{96B47601-FABF-AE48-BF83-19DCD761097A}" type="datetimeFigureOut">
               <a:rPr lang="en-US" smtClean="0"/>
-              <a:t>5/31/19</a:t>
+              <a:t>6/4/19</a:t>
             </a:fld>
             <a:endParaRPr lang="en-US"/>
           </a:p>
@@ -3730,7 +3730,7 @@
                                 <a:ea typeface="Calibri" charset="0"/>
                                 <a:cs typeface="Calibri" charset="0"/>
                               </a:rPr>
-                              <m:t>𝑣</m:t>
+                              <m:t>𝑐</m:t>
                             </m:r>
                           </m:e>
                           <m:sub>
@@ -4021,12 +4021,12 @@
                       </m:sSubPr>
                       <m:e>
                         <m:r>
-                          <a:rPr lang="en-GB" sz="1400" i="1">
+                          <a:rPr lang="en-GB" sz="1400" b="0" i="1" smtClean="0">
                             <a:latin typeface="Cambria Math" panose="02040503050406030204" pitchFamily="18" charset="0"/>
                             <a:ea typeface="Calibri" charset="0"/>
                             <a:cs typeface="Calibri" charset="0"/>
                           </a:rPr>
-                          <m:t>𝑣</m:t>
+                          <m:t>𝑐</m:t>
                         </m:r>
                       </m:e>
                       <m:sub>
@@ -4196,8 +4196,8 @@
           </a:p>
         </p:txBody>
       </p:sp>
-      <mc:AlternateContent xmlns:mc="http://schemas.openxmlformats.org/markup-compatibility/2006">
-        <mc:Choice xmlns:a14="http://schemas.microsoft.com/office/drawing/2010/main" Requires="a14">
+      <mc:AlternateContent xmlns:mc="http://schemas.openxmlformats.org/markup-compatibility/2006" xmlns:a14="http://schemas.microsoft.com/office/drawing/2010/main">
+        <mc:Choice Requires="a14">
           <p:sp>
             <p:nvSpPr>
               <p:cNvPr id="100" name="Rectangle 99">
@@ -4379,7 +4379,7 @@
             </p:txBody>
           </p:sp>
         </mc:Choice>
-        <mc:Fallback>
+        <mc:Fallback xmlns="">
           <p:sp>
             <p:nvSpPr>
               <p:cNvPr id="100" name="Rectangle 99">
@@ -4431,8 +4431,8 @@
           </p:sp>
         </mc:Fallback>
       </mc:AlternateContent>
-      <mc:AlternateContent xmlns:mc="http://schemas.openxmlformats.org/markup-compatibility/2006">
-        <mc:Choice xmlns:a14="http://schemas.microsoft.com/office/drawing/2010/main" Requires="a14">
+      <mc:AlternateContent xmlns:mc="http://schemas.openxmlformats.org/markup-compatibility/2006" xmlns:a14="http://schemas.microsoft.com/office/drawing/2010/main">
+        <mc:Choice Requires="a14">
           <p:sp>
             <p:nvSpPr>
               <p:cNvPr id="101" name="TextBox 100">
@@ -4525,7 +4525,7 @@
             </p:txBody>
           </p:sp>
         </mc:Choice>
-        <mc:Fallback>
+        <mc:Fallback xmlns="">
           <p:sp>
             <p:nvSpPr>
               <p:cNvPr id="101" name="TextBox 100">
@@ -5079,8 +5079,8 @@
           </a:fontRef>
         </p:style>
       </p:cxnSp>
-      <mc:AlternateContent xmlns:mc="http://schemas.openxmlformats.org/markup-compatibility/2006">
-        <mc:Choice xmlns:a14="http://schemas.microsoft.com/office/drawing/2010/main" Requires="a14">
+      <mc:AlternateContent xmlns:mc="http://schemas.openxmlformats.org/markup-compatibility/2006" xmlns:a14="http://schemas.microsoft.com/office/drawing/2010/main">
+        <mc:Choice Requires="a14">
           <p:sp>
             <p:nvSpPr>
               <p:cNvPr id="113" name="TextBox 112">
@@ -5193,7 +5193,7 @@
             </p:txBody>
           </p:sp>
         </mc:Choice>
-        <mc:Fallback>
+        <mc:Fallback xmlns="">
           <p:sp>
             <p:nvSpPr>
               <p:cNvPr id="113" name="TextBox 112">
@@ -5395,8 +5395,8 @@
           </a:p>
         </p:txBody>
       </p:sp>
-      <mc:AlternateContent xmlns:mc="http://schemas.openxmlformats.org/markup-compatibility/2006">
-        <mc:Choice xmlns:a14="http://schemas.microsoft.com/office/drawing/2010/main" Requires="a14">
+      <mc:AlternateContent xmlns:mc="http://schemas.openxmlformats.org/markup-compatibility/2006" xmlns:a14="http://schemas.microsoft.com/office/drawing/2010/main">
+        <mc:Choice Requires="a14">
           <p:sp>
             <p:nvSpPr>
               <p:cNvPr id="117" name="TextBox 116">
@@ -5643,7 +5643,7 @@
             </p:txBody>
           </p:sp>
         </mc:Choice>
-        <mc:Fallback>
+        <mc:Fallback xmlns="">
           <p:sp>
             <p:nvSpPr>
               <p:cNvPr id="117" name="TextBox 116">
@@ -5795,8 +5795,8 @@
           </a:fontRef>
         </p:style>
       </p:cxnSp>
-      <mc:AlternateContent xmlns:mc="http://schemas.openxmlformats.org/markup-compatibility/2006">
-        <mc:Choice xmlns:a14="http://schemas.microsoft.com/office/drawing/2010/main" Requires="a14">
+      <mc:AlternateContent xmlns:mc="http://schemas.openxmlformats.org/markup-compatibility/2006" xmlns:a14="http://schemas.microsoft.com/office/drawing/2010/main">
+        <mc:Choice Requires="a14">
           <p:sp>
             <p:nvSpPr>
               <p:cNvPr id="120" name="Rectangle 119">
@@ -6078,7 +6078,7 @@
             </p:txBody>
           </p:sp>
         </mc:Choice>
-        <mc:Fallback>
+        <mc:Fallback xmlns="">
           <p:sp>
             <p:nvSpPr>
               <p:cNvPr id="120" name="Rectangle 119">
@@ -6227,8 +6227,8 @@
           </a:fontRef>
         </p:style>
       </p:cxnSp>
-      <mc:AlternateContent xmlns:mc="http://schemas.openxmlformats.org/markup-compatibility/2006">
-        <mc:Choice xmlns:a14="http://schemas.microsoft.com/office/drawing/2010/main" Requires="a14">
+      <mc:AlternateContent xmlns:mc="http://schemas.openxmlformats.org/markup-compatibility/2006" xmlns:a14="http://schemas.microsoft.com/office/drawing/2010/main">
+        <mc:Choice Requires="a14">
           <p:sp>
             <p:nvSpPr>
               <p:cNvPr id="123" name="TextBox 122">
@@ -6314,7 +6314,7 @@
             </p:txBody>
           </p:sp>
         </mc:Choice>
-        <mc:Fallback>
+        <mc:Fallback xmlns="">
           <p:sp>
             <p:nvSpPr>
               <p:cNvPr id="123" name="TextBox 122">
@@ -6359,8 +6359,8 @@
           </p:sp>
         </mc:Fallback>
       </mc:AlternateContent>
-      <mc:AlternateContent xmlns:mc="http://schemas.openxmlformats.org/markup-compatibility/2006">
-        <mc:Choice xmlns:a14="http://schemas.microsoft.com/office/drawing/2010/main" Requires="a14">
+      <mc:AlternateContent xmlns:mc="http://schemas.openxmlformats.org/markup-compatibility/2006" xmlns:a14="http://schemas.microsoft.com/office/drawing/2010/main">
+        <mc:Choice Requires="a14">
           <p:sp>
             <p:nvSpPr>
               <p:cNvPr id="124" name="TextBox 123">
@@ -6467,7 +6467,7 @@
             </p:txBody>
           </p:sp>
         </mc:Choice>
-        <mc:Fallback>
+        <mc:Fallback xmlns="">
           <p:sp>
             <p:nvSpPr>
               <p:cNvPr id="124" name="TextBox 123">
@@ -6519,8 +6519,8 @@
           </p:sp>
         </mc:Fallback>
       </mc:AlternateContent>
-      <mc:AlternateContent xmlns:mc="http://schemas.openxmlformats.org/markup-compatibility/2006">
-        <mc:Choice xmlns:a14="http://schemas.microsoft.com/office/drawing/2010/main" Requires="a14">
+      <mc:AlternateContent xmlns:mc="http://schemas.openxmlformats.org/markup-compatibility/2006" xmlns:a14="http://schemas.microsoft.com/office/drawing/2010/main">
+        <mc:Choice Requires="a14">
           <p:sp>
             <p:nvSpPr>
               <p:cNvPr id="125" name="TextBox 124">
@@ -6599,7 +6599,7 @@
             </p:txBody>
           </p:sp>
         </mc:Choice>
-        <mc:Fallback>
+        <mc:Fallback xmlns="">
           <p:sp>
             <p:nvSpPr>
               <p:cNvPr id="125" name="TextBox 124">
@@ -6644,8 +6644,8 @@
           </p:sp>
         </mc:Fallback>
       </mc:AlternateContent>
-      <mc:AlternateContent xmlns:mc="http://schemas.openxmlformats.org/markup-compatibility/2006">
-        <mc:Choice xmlns:a14="http://schemas.microsoft.com/office/drawing/2010/main" Requires="a14">
+      <mc:AlternateContent xmlns:mc="http://schemas.openxmlformats.org/markup-compatibility/2006" xmlns:a14="http://schemas.microsoft.com/office/drawing/2010/main">
+        <mc:Choice Requires="a14">
           <p:sp>
             <p:nvSpPr>
               <p:cNvPr id="126" name="TextBox 125">
@@ -6731,7 +6731,7 @@
             </p:txBody>
           </p:sp>
         </mc:Choice>
-        <mc:Fallback>
+        <mc:Fallback xmlns="">
           <p:sp>
             <p:nvSpPr>
               <p:cNvPr id="126" name="TextBox 125">
@@ -6821,8 +6821,8 @@
           </a:fontRef>
         </p:style>
       </p:cxnSp>
-      <mc:AlternateContent xmlns:mc="http://schemas.openxmlformats.org/markup-compatibility/2006">
-        <mc:Choice xmlns:a14="http://schemas.microsoft.com/office/drawing/2010/main" Requires="a14">
+      <mc:AlternateContent xmlns:mc="http://schemas.openxmlformats.org/markup-compatibility/2006" xmlns:a14="http://schemas.microsoft.com/office/drawing/2010/main">
+        <mc:Choice Requires="a14">
           <p:sp>
             <p:nvSpPr>
               <p:cNvPr id="128" name="TextBox 127">
@@ -6958,7 +6958,7 @@
             </p:txBody>
           </p:sp>
         </mc:Choice>
-        <mc:Fallback>
+        <mc:Fallback xmlns="">
           <p:sp>
             <p:nvSpPr>
               <p:cNvPr id="128" name="TextBox 127">
@@ -7149,8 +7149,8 @@
           </a:fontRef>
         </p:style>
       </p:cxnSp>
-      <mc:AlternateContent xmlns:mc="http://schemas.openxmlformats.org/markup-compatibility/2006">
-        <mc:Choice xmlns:a14="http://schemas.microsoft.com/office/drawing/2010/main" Requires="a14">
+      <mc:AlternateContent xmlns:mc="http://schemas.openxmlformats.org/markup-compatibility/2006" xmlns:a14="http://schemas.microsoft.com/office/drawing/2010/main">
+        <mc:Choice Requires="a14">
           <p:sp>
             <p:nvSpPr>
               <p:cNvPr id="132" name="TextBox 131">
@@ -7229,7 +7229,7 @@
             </p:txBody>
           </p:sp>
         </mc:Choice>
-        <mc:Fallback>
+        <mc:Fallback xmlns="">
           <p:sp>
             <p:nvSpPr>
               <p:cNvPr id="132" name="TextBox 131">
@@ -7418,8 +7418,8 @@
           </a:p>
         </p:txBody>
       </p:sp>
-      <mc:AlternateContent xmlns:mc="http://schemas.openxmlformats.org/markup-compatibility/2006">
-        <mc:Choice xmlns:a14="http://schemas.microsoft.com/office/drawing/2010/main" Requires="a14">
+      <mc:AlternateContent xmlns:mc="http://schemas.openxmlformats.org/markup-compatibility/2006" xmlns:a14="http://schemas.microsoft.com/office/drawing/2010/main">
+        <mc:Choice Requires="a14">
           <p:sp>
             <p:nvSpPr>
               <p:cNvPr id="136" name="TextBox 135">
@@ -7498,7 +7498,7 @@
             </p:txBody>
           </p:sp>
         </mc:Choice>
-        <mc:Fallback>
+        <mc:Fallback xmlns="">
           <p:sp>
             <p:nvSpPr>
               <p:cNvPr id="136" name="TextBox 135">
@@ -7687,8 +7687,8 @@
           </a:fontRef>
         </p:style>
       </p:cxnSp>
-      <mc:AlternateContent xmlns:mc="http://schemas.openxmlformats.org/markup-compatibility/2006">
-        <mc:Choice xmlns:a14="http://schemas.microsoft.com/office/drawing/2010/main" Requires="a14">
+      <mc:AlternateContent xmlns:mc="http://schemas.openxmlformats.org/markup-compatibility/2006" xmlns:a14="http://schemas.microsoft.com/office/drawing/2010/main">
+        <mc:Choice Requires="a14">
           <p:sp>
             <p:nvSpPr>
               <p:cNvPr id="140" name="TextBox 139">
@@ -7774,7 +7774,7 @@
             </p:txBody>
           </p:sp>
         </mc:Choice>
-        <mc:Fallback>
+        <mc:Fallback xmlns="">
           <p:sp>
             <p:nvSpPr>
               <p:cNvPr id="140" name="TextBox 139">
@@ -7918,8 +7918,8 @@
           </a:fontRef>
         </p:style>
       </p:cxnSp>
-      <mc:AlternateContent xmlns:mc="http://schemas.openxmlformats.org/markup-compatibility/2006">
-        <mc:Choice xmlns:a14="http://schemas.microsoft.com/office/drawing/2010/main" Requires="a14">
+      <mc:AlternateContent xmlns:mc="http://schemas.openxmlformats.org/markup-compatibility/2006" xmlns:a14="http://schemas.microsoft.com/office/drawing/2010/main">
+        <mc:Choice Requires="a14">
           <p:sp>
             <p:nvSpPr>
               <p:cNvPr id="143" name="TextBox 142">
@@ -7998,7 +7998,7 @@
             </p:txBody>
           </p:sp>
         </mc:Choice>
-        <mc:Fallback>
+        <mc:Fallback xmlns="">
           <p:sp>
             <p:nvSpPr>
               <p:cNvPr id="143" name="TextBox 142">
@@ -8043,8 +8043,8 @@
           </p:sp>
         </mc:Fallback>
       </mc:AlternateContent>
-      <mc:AlternateContent xmlns:mc="http://schemas.openxmlformats.org/markup-compatibility/2006">
-        <mc:Choice xmlns:a14="http://schemas.microsoft.com/office/drawing/2010/main" Requires="a14">
+      <mc:AlternateContent xmlns:mc="http://schemas.openxmlformats.org/markup-compatibility/2006" xmlns:a14="http://schemas.microsoft.com/office/drawing/2010/main">
+        <mc:Choice Requires="a14">
           <p:sp>
             <p:nvSpPr>
               <p:cNvPr id="144" name="Rectangle 143">
@@ -8126,7 +8126,7 @@
             </p:txBody>
           </p:sp>
         </mc:Choice>
-        <mc:Fallback>
+        <mc:Fallback xmlns="">
           <p:sp>
             <p:nvSpPr>
               <p:cNvPr id="144" name="Rectangle 143">
@@ -8419,8 +8419,8 @@
           </a:fontRef>
         </p:style>
       </p:cxnSp>
-      <mc:AlternateContent xmlns:mc="http://schemas.openxmlformats.org/markup-compatibility/2006">
-        <mc:Choice xmlns:a14="http://schemas.microsoft.com/office/drawing/2010/main" Requires="a14">
+      <mc:AlternateContent xmlns:mc="http://schemas.openxmlformats.org/markup-compatibility/2006" xmlns:a14="http://schemas.microsoft.com/office/drawing/2010/main">
+        <mc:Choice Requires="a14">
           <p:sp>
             <p:nvSpPr>
               <p:cNvPr id="150" name="TextBox 149">
@@ -8506,7 +8506,7 @@
             </p:txBody>
           </p:sp>
         </mc:Choice>
-        <mc:Fallback>
+        <mc:Fallback xmlns="">
           <p:sp>
             <p:nvSpPr>
               <p:cNvPr id="150" name="TextBox 149">
@@ -8733,8 +8733,8 @@
           </a:fontRef>
         </p:style>
       </p:cxnSp>
-      <mc:AlternateContent xmlns:mc="http://schemas.openxmlformats.org/markup-compatibility/2006">
-        <mc:Choice xmlns:a14="http://schemas.microsoft.com/office/drawing/2010/main" Requires="a14">
+      <mc:AlternateContent xmlns:mc="http://schemas.openxmlformats.org/markup-compatibility/2006" xmlns:a14="http://schemas.microsoft.com/office/drawing/2010/main">
+        <mc:Choice Requires="a14">
           <p:sp>
             <p:nvSpPr>
               <p:cNvPr id="155" name="TextBox 154">
@@ -8813,7 +8813,7 @@
             </p:txBody>
           </p:sp>
         </mc:Choice>
-        <mc:Fallback>
+        <mc:Fallback xmlns="">
           <p:sp>
             <p:nvSpPr>
               <p:cNvPr id="155" name="TextBox 154">
@@ -8903,8 +8903,8 @@
           </a:fontRef>
         </p:style>
       </p:cxnSp>
-      <mc:AlternateContent xmlns:mc="http://schemas.openxmlformats.org/markup-compatibility/2006">
-        <mc:Choice xmlns:a14="http://schemas.microsoft.com/office/drawing/2010/main" Requires="a14">
+      <mc:AlternateContent xmlns:mc="http://schemas.openxmlformats.org/markup-compatibility/2006" xmlns:a14="http://schemas.microsoft.com/office/drawing/2010/main">
+        <mc:Choice Requires="a14">
           <p:sp>
             <p:nvSpPr>
               <p:cNvPr id="157" name="TextBox 156">
@@ -8983,7 +8983,7 @@
             </p:txBody>
           </p:sp>
         </mc:Choice>
-        <mc:Fallback>
+        <mc:Fallback xmlns="">
           <p:sp>
             <p:nvSpPr>
               <p:cNvPr id="157" name="TextBox 156">
@@ -9077,8 +9077,8 @@
         </p:nvSpPr>
         <p:spPr>
           <a:xfrm>
-            <a:off x="12485967" y="2899020"/>
-            <a:ext cx="956785" cy="261610"/>
+            <a:off x="12406469" y="2899019"/>
+            <a:ext cx="766119" cy="261610"/>
           </a:xfrm>
           <a:prstGeom prst="rect">
             <a:avLst/>
@@ -15219,10 +15219,10 @@
       </p:grpSpPr>
       <p:pic>
         <p:nvPicPr>
-          <p:cNvPr id="9" name="Picture 8" descr="A screenshot of a social media post&#10;&#10;Description automatically generated">
+          <p:cNvPr id="3" name="Picture 2" descr="A screenshot of a social media post&#10;&#10;Description automatically generated">
             <a:extLst>
               <a:ext uri="{FF2B5EF4-FFF2-40B4-BE49-F238E27FC236}">
-                <a16:creationId xmlns:a16="http://schemas.microsoft.com/office/drawing/2014/main" id="{610C2F64-4AEE-2B43-BA4F-CAF1162F87D9}"/>
+                <a16:creationId xmlns:a16="http://schemas.microsoft.com/office/drawing/2014/main" id="{8D6603D2-25A6-AE4F-83BB-BAB44B504425}"/>
               </a:ext>
             </a:extLst>
           </p:cNvPr>
@@ -15233,13 +15233,13 @@
         </p:nvPicPr>
         <p:blipFill rotWithShape="1">
           <a:blip r:embed="rId2"/>
-          <a:srcRect l="30706" t="1131" r="522" b="867"/>
+          <a:srcRect l="30787" t="1422" r="546" b="1211"/>
           <a:stretch/>
         </p:blipFill>
         <p:spPr>
           <a:xfrm>
-            <a:off x="6743700" y="3528290"/>
-            <a:ext cx="11424227" cy="7019637"/>
+            <a:off x="6757261" y="3549112"/>
+            <a:ext cx="11406754" cy="6974237"/>
           </a:xfrm>
           <a:prstGeom prst="rect">
             <a:avLst/>

</xml_diff>

<commit_message>
Editing Work: review up to 6.2 Added conclusion (quick draft - no review yet)
</commit_message>
<xml_diff>
--- a/figures/Powerpoint/DesginConsensusAndDatabase.pptx
+++ b/figures/Powerpoint/DesginConsensusAndDatabase.pptx
@@ -245,7 +245,7 @@
           <a:p>
             <a:fld id="{96B47601-FABF-AE48-BF83-19DCD761097A}" type="datetimeFigureOut">
               <a:rPr lang="en-US" smtClean="0"/>
-              <a:t>6/4/19</a:t>
+              <a:t>6/6/19</a:t>
             </a:fld>
             <a:endParaRPr lang="en-US"/>
           </a:p>
@@ -415,7 +415,7 @@
           <a:p>
             <a:fld id="{96B47601-FABF-AE48-BF83-19DCD761097A}" type="datetimeFigureOut">
               <a:rPr lang="en-US" smtClean="0"/>
-              <a:t>6/4/19</a:t>
+              <a:t>6/6/19</a:t>
             </a:fld>
             <a:endParaRPr lang="en-US"/>
           </a:p>
@@ -595,7 +595,7 @@
           <a:p>
             <a:fld id="{96B47601-FABF-AE48-BF83-19DCD761097A}" type="datetimeFigureOut">
               <a:rPr lang="en-US" smtClean="0"/>
-              <a:t>6/4/19</a:t>
+              <a:t>6/6/19</a:t>
             </a:fld>
             <a:endParaRPr lang="en-US"/>
           </a:p>
@@ -765,7 +765,7 @@
           <a:p>
             <a:fld id="{96B47601-FABF-AE48-BF83-19DCD761097A}" type="datetimeFigureOut">
               <a:rPr lang="en-US" smtClean="0"/>
-              <a:t>6/4/19</a:t>
+              <a:t>6/6/19</a:t>
             </a:fld>
             <a:endParaRPr lang="en-US"/>
           </a:p>
@@ -1009,7 +1009,7 @@
           <a:p>
             <a:fld id="{96B47601-FABF-AE48-BF83-19DCD761097A}" type="datetimeFigureOut">
               <a:rPr lang="en-US" smtClean="0"/>
-              <a:t>6/4/19</a:t>
+              <a:t>6/6/19</a:t>
             </a:fld>
             <a:endParaRPr lang="en-US"/>
           </a:p>
@@ -1241,7 +1241,7 @@
           <a:p>
             <a:fld id="{96B47601-FABF-AE48-BF83-19DCD761097A}" type="datetimeFigureOut">
               <a:rPr lang="en-US" smtClean="0"/>
-              <a:t>6/4/19</a:t>
+              <a:t>6/6/19</a:t>
             </a:fld>
             <a:endParaRPr lang="en-US"/>
           </a:p>
@@ -1608,7 +1608,7 @@
           <a:p>
             <a:fld id="{96B47601-FABF-AE48-BF83-19DCD761097A}" type="datetimeFigureOut">
               <a:rPr lang="en-US" smtClean="0"/>
-              <a:t>6/4/19</a:t>
+              <a:t>6/6/19</a:t>
             </a:fld>
             <a:endParaRPr lang="en-US"/>
           </a:p>
@@ -1726,7 +1726,7 @@
           <a:p>
             <a:fld id="{96B47601-FABF-AE48-BF83-19DCD761097A}" type="datetimeFigureOut">
               <a:rPr lang="en-US" smtClean="0"/>
-              <a:t>6/4/19</a:t>
+              <a:t>6/6/19</a:t>
             </a:fld>
             <a:endParaRPr lang="en-US"/>
           </a:p>
@@ -1821,7 +1821,7 @@
           <a:p>
             <a:fld id="{96B47601-FABF-AE48-BF83-19DCD761097A}" type="datetimeFigureOut">
               <a:rPr lang="en-US" smtClean="0"/>
-              <a:t>6/4/19</a:t>
+              <a:t>6/6/19</a:t>
             </a:fld>
             <a:endParaRPr lang="en-US"/>
           </a:p>
@@ -2098,7 +2098,7 @@
           <a:p>
             <a:fld id="{96B47601-FABF-AE48-BF83-19DCD761097A}" type="datetimeFigureOut">
               <a:rPr lang="en-US" smtClean="0"/>
-              <a:t>6/4/19</a:t>
+              <a:t>6/6/19</a:t>
             </a:fld>
             <a:endParaRPr lang="en-US"/>
           </a:p>
@@ -2355,7 +2355,7 @@
           <a:p>
             <a:fld id="{96B47601-FABF-AE48-BF83-19DCD761097A}" type="datetimeFigureOut">
               <a:rPr lang="en-US" smtClean="0"/>
-              <a:t>6/4/19</a:t>
+              <a:t>6/6/19</a:t>
             </a:fld>
             <a:endParaRPr lang="en-US"/>
           </a:p>
@@ -2568,7 +2568,7 @@
           <a:p>
             <a:fld id="{96B47601-FABF-AE48-BF83-19DCD761097A}" type="datetimeFigureOut">
               <a:rPr lang="en-US" smtClean="0"/>
-              <a:t>6/4/19</a:t>
+              <a:t>6/6/19</a:t>
             </a:fld>
             <a:endParaRPr lang="en-US"/>
           </a:p>
@@ -3653,8 +3653,8 @@
           </a:p>
         </p:txBody>
       </p:sp>
-      <mc:AlternateContent xmlns:mc="http://schemas.openxmlformats.org/markup-compatibility/2006">
-        <mc:Choice xmlns:a14="http://schemas.microsoft.com/office/drawing/2010/main" Requires="a14">
+      <mc:AlternateContent xmlns:mc="http://schemas.openxmlformats.org/markup-compatibility/2006" xmlns:a14="http://schemas.microsoft.com/office/drawing/2010/main">
+        <mc:Choice Requires="a14">
           <p:sp>
             <p:nvSpPr>
               <p:cNvPr id="94" name="TextBox 93">
@@ -3820,7 +3820,7 @@
             </p:txBody>
           </p:sp>
         </mc:Choice>
-        <mc:Fallback>
+        <mc:Fallback xmlns="">
           <p:sp>
             <p:nvSpPr>
               <p:cNvPr id="94" name="TextBox 93">
@@ -3962,8 +3962,8 @@
           </a:fontRef>
         </p:style>
       </p:cxnSp>
-      <mc:AlternateContent xmlns:mc="http://schemas.openxmlformats.org/markup-compatibility/2006">
-        <mc:Choice xmlns:a14="http://schemas.microsoft.com/office/drawing/2010/main" Requires="a14">
+      <mc:AlternateContent xmlns:mc="http://schemas.openxmlformats.org/markup-compatibility/2006" xmlns:a14="http://schemas.microsoft.com/office/drawing/2010/main">
+        <mc:Choice Requires="a14">
           <p:sp>
             <p:nvSpPr>
               <p:cNvPr id="97" name="TextBox 96">
@@ -4051,7 +4051,7 @@
             </p:txBody>
           </p:sp>
         </mc:Choice>
-        <mc:Fallback>
+        <mc:Fallback xmlns="">
           <p:sp>
             <p:nvSpPr>
               <p:cNvPr id="97" name="TextBox 96">
@@ -5079,8 +5079,8 @@
           </a:fontRef>
         </p:style>
       </p:cxnSp>
-      <mc:AlternateContent xmlns:mc="http://schemas.openxmlformats.org/markup-compatibility/2006" xmlns:a14="http://schemas.microsoft.com/office/drawing/2010/main">
-        <mc:Choice Requires="a14">
+      <mc:AlternateContent xmlns:mc="http://schemas.openxmlformats.org/markup-compatibility/2006">
+        <mc:Choice xmlns:a14="http://schemas.microsoft.com/office/drawing/2010/main" Requires="a14">
           <p:sp>
             <p:nvSpPr>
               <p:cNvPr id="113" name="TextBox 112">
@@ -5128,18 +5128,10 @@
                 </a:r>
                 <a14:m>
                   <m:oMath xmlns:m="http://schemas.openxmlformats.org/officeDocument/2006/math">
-                    <m:r>
-                      <a:rPr lang="en-GB" sz="1400" i="1" dirty="0" smtClean="0">
-                        <a:latin typeface="Cambria Math" panose="02040503050406030204" pitchFamily="18" charset="0"/>
-                        <a:ea typeface="Calibri" charset="0"/>
-                        <a:cs typeface="Calibri" charset="0"/>
-                      </a:rPr>
-                      <m:t>𝐿𝑆</m:t>
-                    </m:r>
                     <m:sSub>
                       <m:sSubPr>
                         <m:ctrlPr>
-                          <a:rPr lang="en-GB" sz="1400" b="0" i="1" dirty="0" smtClean="0">
+                          <a:rPr lang="en-GB" sz="1400" b="0" i="0" dirty="0" smtClean="0">
                             <a:latin typeface="Cambria Math" panose="02040503050406030204" pitchFamily="18" charset="0"/>
                             <a:ea typeface="Calibri" charset="0"/>
                             <a:cs typeface="Calibri" charset="0"/>
@@ -5148,22 +5140,28 @@
                       </m:sSubPr>
                       <m:e>
                         <m:r>
-                          <a:rPr lang="en-GB" sz="1400" i="1" dirty="0" smtClean="0">
+                          <m:rPr>
+                            <m:sty m:val="p"/>
+                          </m:rPr>
+                          <a:rPr lang="en-GB" sz="1400" b="0" i="0" dirty="0" smtClean="0">
                             <a:latin typeface="Cambria Math" panose="02040503050406030204" pitchFamily="18" charset="0"/>
                             <a:ea typeface="Calibri" charset="0"/>
                             <a:cs typeface="Calibri" charset="0"/>
                           </a:rPr>
-                          <m:t>𝑈</m:t>
+                          <m:t>v</m:t>
                         </m:r>
                       </m:e>
                       <m:sub>
                         <m:r>
-                          <a:rPr lang="en-GB" sz="1400" b="0" i="1" dirty="0" smtClean="0">
+                          <m:rPr>
+                            <m:sty m:val="p"/>
+                          </m:rPr>
+                          <a:rPr lang="en-GB" sz="1400" b="0" i="0" dirty="0" smtClean="0">
                             <a:latin typeface="Cambria Math" panose="02040503050406030204" pitchFamily="18" charset="0"/>
                             <a:ea typeface="Calibri" charset="0"/>
                             <a:cs typeface="Calibri" charset="0"/>
                           </a:rPr>
-                          <m:t>𝑗</m:t>
+                          <m:t>j</m:t>
                         </m:r>
                       </m:sub>
                     </m:sSub>
@@ -5193,7 +5191,7 @@
             </p:txBody>
           </p:sp>
         </mc:Choice>
-        <mc:Fallback xmlns="">
+        <mc:Fallback>
           <p:sp>
             <p:nvSpPr>
               <p:cNvPr id="113" name="TextBox 112">
@@ -5390,7 +5388,7 @@
                 <a:ea typeface="Calibri" charset="0"/>
                 <a:cs typeface="Calibri" charset="0"/>
               </a:rPr>
-              <a:t>Production</a:t>
+              <a:t>Construction</a:t>
             </a:r>
           </a:p>
         </p:txBody>
@@ -8277,52 +8275,162 @@
           </a:p>
         </p:txBody>
       </p:sp>
-      <p:sp>
-        <p:nvSpPr>
-          <p:cNvPr id="147" name="TextBox 146">
-            <a:extLst>
-              <a:ext uri="{FF2B5EF4-FFF2-40B4-BE49-F238E27FC236}">
-                <a16:creationId xmlns:a16="http://schemas.microsoft.com/office/drawing/2014/main" id="{7CC881ED-7526-E54B-9DC9-CA21358D32FE}"/>
-              </a:ext>
-            </a:extLst>
-          </p:cNvPr>
-          <p:cNvSpPr txBox="1"/>
-          <p:nvPr/>
-        </p:nvSpPr>
-        <p:spPr>
-          <a:xfrm>
-            <a:off x="12575541" y="5725592"/>
-            <a:ext cx="1418353" cy="307777"/>
-          </a:xfrm>
-          <a:prstGeom prst="rect">
-            <a:avLst/>
-          </a:prstGeom>
-          <a:solidFill>
-            <a:schemeClr val="bg1"/>
-          </a:solidFill>
-          <a:ln>
-            <a:solidFill>
-              <a:srgbClr val="7030A0"/>
-            </a:solidFill>
-          </a:ln>
-        </p:spPr>
-        <p:txBody>
-          <a:bodyPr wrap="square" rtlCol="0">
-            <a:spAutoFit/>
-          </a:bodyPr>
-          <a:lstStyle/>
-          <a:p>
-            <a:r>
-              <a:rPr lang="en-US" sz="1400" dirty="0">
-                <a:latin typeface="Calibri" panose="020F0502020204030204" pitchFamily="34" charset="0"/>
-                <a:ea typeface="Calibri" charset="0"/>
-                <a:cs typeface="Calibri" panose="020F0502020204030204" pitchFamily="34" charset="0"/>
-              </a:rPr>
-              <a:t>Votes collection</a:t>
-            </a:r>
-          </a:p>
-        </p:txBody>
-      </p:sp>
+      <mc:AlternateContent xmlns:mc="http://schemas.openxmlformats.org/markup-compatibility/2006">
+        <mc:Choice xmlns:a14="http://schemas.microsoft.com/office/drawing/2010/main" Requires="a14">
+          <p:sp>
+            <p:nvSpPr>
+              <p:cNvPr id="147" name="TextBox 146">
+                <a:extLst>
+                  <a:ext uri="{FF2B5EF4-FFF2-40B4-BE49-F238E27FC236}">
+                    <a16:creationId xmlns:a16="http://schemas.microsoft.com/office/drawing/2014/main" id="{7CC881ED-7526-E54B-9DC9-CA21358D32FE}"/>
+                  </a:ext>
+                </a:extLst>
+              </p:cNvPr>
+              <p:cNvSpPr txBox="1"/>
+              <p:nvPr/>
+            </p:nvSpPr>
+            <p:spPr>
+              <a:xfrm>
+                <a:off x="12575541" y="5725592"/>
+                <a:ext cx="1609210" cy="307777"/>
+              </a:xfrm>
+              <a:prstGeom prst="rect">
+                <a:avLst/>
+              </a:prstGeom>
+              <a:solidFill>
+                <a:schemeClr val="bg1"/>
+              </a:solidFill>
+              <a:ln>
+                <a:solidFill>
+                  <a:srgbClr val="7030A0"/>
+                </a:solidFill>
+              </a:ln>
+            </p:spPr>
+            <p:txBody>
+              <a:bodyPr wrap="square" rtlCol="0">
+                <a:spAutoFit/>
+              </a:bodyPr>
+              <a:lstStyle/>
+              <a:p>
+                <a:r>
+                  <a:rPr lang="en-US" sz="1400" dirty="0">
+                    <a:latin typeface="Calibri" panose="020F0502020204030204" pitchFamily="34" charset="0"/>
+                    <a:ea typeface="Calibri" charset="0"/>
+                    <a:cs typeface="Calibri" panose="020F0502020204030204" pitchFamily="34" charset="0"/>
+                  </a:rPr>
+                  <a:t>Votes </a:t>
+                </a:r>
+                <a14:m>
+                  <m:oMath xmlns:m="http://schemas.openxmlformats.org/officeDocument/2006/math">
+                    <m:sSub>
+                      <m:sSubPr>
+                        <m:ctrlPr>
+                          <a:rPr lang="en-GB" sz="1400" i="1" dirty="0">
+                            <a:latin typeface="Cambria Math" panose="02040503050406030204" pitchFamily="18" charset="0"/>
+                            <a:ea typeface="Calibri" charset="0"/>
+                            <a:cs typeface="Calibri" charset="0"/>
+                          </a:rPr>
+                        </m:ctrlPr>
+                      </m:sSubPr>
+                      <m:e>
+                        <m:r>
+                          <m:rPr>
+                            <m:sty m:val="p"/>
+                          </m:rPr>
+                          <a:rPr lang="en-GB" sz="1400" dirty="0">
+                            <a:latin typeface="Cambria Math" panose="02040503050406030204" pitchFamily="18" charset="0"/>
+                            <a:ea typeface="Calibri" charset="0"/>
+                            <a:cs typeface="Calibri" charset="0"/>
+                          </a:rPr>
+                          <m:t>v</m:t>
+                        </m:r>
+                      </m:e>
+                      <m:sub>
+                        <m:r>
+                          <m:rPr>
+                            <m:sty m:val="p"/>
+                          </m:rPr>
+                          <a:rPr lang="en-GB" sz="1400" b="0" i="0" dirty="0" smtClean="0">
+                            <a:latin typeface="Cambria Math" panose="02040503050406030204" pitchFamily="18" charset="0"/>
+                            <a:ea typeface="Calibri" charset="0"/>
+                            <a:cs typeface="Calibri" charset="0"/>
+                          </a:rPr>
+                          <m:t>k</m:t>
+                        </m:r>
+                      </m:sub>
+                    </m:sSub>
+                  </m:oMath>
+                </a14:m>
+                <a:r>
+                  <a:rPr lang="en-GB" sz="1400" dirty="0">
+                    <a:latin typeface="Calibri" charset="0"/>
+                    <a:ea typeface="Calibri" charset="0"/>
+                    <a:cs typeface="Calibri" charset="0"/>
+                  </a:rPr>
+                  <a:t> </a:t>
+                </a:r>
+                <a:r>
+                  <a:rPr lang="en-US" sz="1400" dirty="0">
+                    <a:latin typeface="Calibri" panose="020F0502020204030204" pitchFamily="34" charset="0"/>
+                    <a:ea typeface="Calibri" charset="0"/>
+                    <a:cs typeface="Calibri" panose="020F0502020204030204" pitchFamily="34" charset="0"/>
+                  </a:rPr>
+                  <a:t>collection</a:t>
+                </a:r>
+              </a:p>
+            </p:txBody>
+          </p:sp>
+        </mc:Choice>
+        <mc:Fallback>
+          <p:sp>
+            <p:nvSpPr>
+              <p:cNvPr id="147" name="TextBox 146">
+                <a:extLst>
+                  <a:ext uri="{FF2B5EF4-FFF2-40B4-BE49-F238E27FC236}">
+                    <a16:creationId xmlns:a16="http://schemas.microsoft.com/office/drawing/2014/main" id="{7CC881ED-7526-E54B-9DC9-CA21358D32FE}"/>
+                  </a:ext>
+                </a:extLst>
+              </p:cNvPr>
+              <p:cNvSpPr txBox="1">
+                <a:spLocks noRot="1" noChangeAspect="1" noMove="1" noResize="1" noEditPoints="1" noAdjustHandles="1" noChangeArrowheads="1" noChangeShapeType="1" noTextEdit="1"/>
+              </p:cNvSpPr>
+              <p:nvPr/>
+            </p:nvSpPr>
+            <p:spPr>
+              <a:xfrm>
+                <a:off x="12575541" y="5725592"/>
+                <a:ext cx="1609210" cy="307777"/>
+              </a:xfrm>
+              <a:prstGeom prst="rect">
+                <a:avLst/>
+              </a:prstGeom>
+              <a:blipFill>
+                <a:blip r:embed="rId19"/>
+                <a:stretch>
+                  <a:fillRect l="-775" t="-3846" b="-15385"/>
+                </a:stretch>
+              </a:blipFill>
+              <a:ln>
+                <a:solidFill>
+                  <a:srgbClr val="7030A0"/>
+                </a:solidFill>
+              </a:ln>
+            </p:spPr>
+            <p:txBody>
+              <a:bodyPr/>
+              <a:lstStyle/>
+              <a:p>
+                <a:r>
+                  <a:rPr lang="en-US">
+                    <a:noFill/>
+                  </a:rPr>
+                  <a:t> </a:t>
+                </a:r>
+              </a:p>
+            </p:txBody>
+          </p:sp>
+        </mc:Fallback>
+      </mc:AlternateContent>
       <p:sp>
         <p:nvSpPr>
           <p:cNvPr id="148" name="Right Brace 147">
@@ -8530,7 +8638,7 @@
                 <a:avLst/>
               </a:prstGeom>
               <a:blipFill>
-                <a:blip r:embed="rId19"/>
+                <a:blip r:embed="rId20"/>
                 <a:stretch>
                   <a:fillRect l="-18750" r="-15625" b="-13043"/>
                 </a:stretch>
@@ -8837,7 +8945,7 @@
                 <a:avLst/>
               </a:prstGeom>
               <a:blipFill>
-                <a:blip r:embed="rId20"/>
+                <a:blip r:embed="rId21"/>
                 <a:stretch>
                   <a:fillRect b="-9091"/>
                 </a:stretch>
@@ -9007,7 +9115,7 @@
                 <a:avLst/>
               </a:prstGeom>
               <a:blipFill>
-                <a:blip r:embed="rId21"/>
+                <a:blip r:embed="rId22"/>
                 <a:stretch>
                   <a:fillRect l="-9375" b="-9091"/>
                 </a:stretch>
@@ -15219,10 +15327,10 @@
       </p:grpSpPr>
       <p:pic>
         <p:nvPicPr>
-          <p:cNvPr id="3" name="Picture 2" descr="A screenshot of a social media post&#10;&#10;Description automatically generated">
+          <p:cNvPr id="4" name="Picture 3" descr="A screenshot of a social media post&#10;&#10;Description automatically generated">
             <a:extLst>
               <a:ext uri="{FF2B5EF4-FFF2-40B4-BE49-F238E27FC236}">
-                <a16:creationId xmlns:a16="http://schemas.microsoft.com/office/drawing/2014/main" id="{8D6603D2-25A6-AE4F-83BB-BAB44B504425}"/>
+                <a16:creationId xmlns:a16="http://schemas.microsoft.com/office/drawing/2014/main" id="{D681B31A-6B2E-D941-9734-EE1EB232060C}"/>
               </a:ext>
             </a:extLst>
           </p:cNvPr>
@@ -15233,13 +15341,13 @@
         </p:nvPicPr>
         <p:blipFill rotWithShape="1">
           <a:blip r:embed="rId2"/>
-          <a:srcRect l="30787" t="1422" r="546" b="1211"/>
+          <a:srcRect l="30518" t="1775" r="550" b="1029"/>
           <a:stretch/>
         </p:blipFill>
         <p:spPr>
           <a:xfrm>
-            <a:off x="6757261" y="3549112"/>
-            <a:ext cx="11406754" cy="6974237"/>
+            <a:off x="6525490" y="2971800"/>
+            <a:ext cx="11450783" cy="6961909"/>
           </a:xfrm>
           <a:prstGeom prst="rect">
             <a:avLst/>

</xml_diff>

<commit_message>
Edit work related to issue #15
</commit_message>
<xml_diff>
--- a/figures/Powerpoint/DesginConsensusAndDatabase.pptx
+++ b/figures/Powerpoint/DesginConsensusAndDatabase.pptx
@@ -245,7 +245,7 @@
           <a:p>
             <a:fld id="{96B47601-FABF-AE48-BF83-19DCD761097A}" type="datetimeFigureOut">
               <a:rPr lang="en-US" smtClean="0"/>
-              <a:t>6/6/19</a:t>
+              <a:t>6/14/19</a:t>
             </a:fld>
             <a:endParaRPr lang="en-US"/>
           </a:p>
@@ -415,7 +415,7 @@
           <a:p>
             <a:fld id="{96B47601-FABF-AE48-BF83-19DCD761097A}" type="datetimeFigureOut">
               <a:rPr lang="en-US" smtClean="0"/>
-              <a:t>6/6/19</a:t>
+              <a:t>6/14/19</a:t>
             </a:fld>
             <a:endParaRPr lang="en-US"/>
           </a:p>
@@ -595,7 +595,7 @@
           <a:p>
             <a:fld id="{96B47601-FABF-AE48-BF83-19DCD761097A}" type="datetimeFigureOut">
               <a:rPr lang="en-US" smtClean="0"/>
-              <a:t>6/6/19</a:t>
+              <a:t>6/14/19</a:t>
             </a:fld>
             <a:endParaRPr lang="en-US"/>
           </a:p>
@@ -765,7 +765,7 @@
           <a:p>
             <a:fld id="{96B47601-FABF-AE48-BF83-19DCD761097A}" type="datetimeFigureOut">
               <a:rPr lang="en-US" smtClean="0"/>
-              <a:t>6/6/19</a:t>
+              <a:t>6/14/19</a:t>
             </a:fld>
             <a:endParaRPr lang="en-US"/>
           </a:p>
@@ -1009,7 +1009,7 @@
           <a:p>
             <a:fld id="{96B47601-FABF-AE48-BF83-19DCD761097A}" type="datetimeFigureOut">
               <a:rPr lang="en-US" smtClean="0"/>
-              <a:t>6/6/19</a:t>
+              <a:t>6/14/19</a:t>
             </a:fld>
             <a:endParaRPr lang="en-US"/>
           </a:p>
@@ -1241,7 +1241,7 @@
           <a:p>
             <a:fld id="{96B47601-FABF-AE48-BF83-19DCD761097A}" type="datetimeFigureOut">
               <a:rPr lang="en-US" smtClean="0"/>
-              <a:t>6/6/19</a:t>
+              <a:t>6/14/19</a:t>
             </a:fld>
             <a:endParaRPr lang="en-US"/>
           </a:p>
@@ -1608,7 +1608,7 @@
           <a:p>
             <a:fld id="{96B47601-FABF-AE48-BF83-19DCD761097A}" type="datetimeFigureOut">
               <a:rPr lang="en-US" smtClean="0"/>
-              <a:t>6/6/19</a:t>
+              <a:t>6/14/19</a:t>
             </a:fld>
             <a:endParaRPr lang="en-US"/>
           </a:p>
@@ -1726,7 +1726,7 @@
           <a:p>
             <a:fld id="{96B47601-FABF-AE48-BF83-19DCD761097A}" type="datetimeFigureOut">
               <a:rPr lang="en-US" smtClean="0"/>
-              <a:t>6/6/19</a:t>
+              <a:t>6/14/19</a:t>
             </a:fld>
             <a:endParaRPr lang="en-US"/>
           </a:p>
@@ -1821,7 +1821,7 @@
           <a:p>
             <a:fld id="{96B47601-FABF-AE48-BF83-19DCD761097A}" type="datetimeFigureOut">
               <a:rPr lang="en-US" smtClean="0"/>
-              <a:t>6/6/19</a:t>
+              <a:t>6/14/19</a:t>
             </a:fld>
             <a:endParaRPr lang="en-US"/>
           </a:p>
@@ -2098,7 +2098,7 @@
           <a:p>
             <a:fld id="{96B47601-FABF-AE48-BF83-19DCD761097A}" type="datetimeFigureOut">
               <a:rPr lang="en-US" smtClean="0"/>
-              <a:t>6/6/19</a:t>
+              <a:t>6/14/19</a:t>
             </a:fld>
             <a:endParaRPr lang="en-US"/>
           </a:p>
@@ -2355,7 +2355,7 @@
           <a:p>
             <a:fld id="{96B47601-FABF-AE48-BF83-19DCD761097A}" type="datetimeFigureOut">
               <a:rPr lang="en-US" smtClean="0"/>
-              <a:t>6/6/19</a:t>
+              <a:t>6/14/19</a:t>
             </a:fld>
             <a:endParaRPr lang="en-US"/>
           </a:p>
@@ -2568,7 +2568,7 @@
           <a:p>
             <a:fld id="{96B47601-FABF-AE48-BF83-19DCD761097A}" type="datetimeFigureOut">
               <a:rPr lang="en-US" smtClean="0"/>
-              <a:t>6/6/19</a:t>
+              <a:t>6/14/19</a:t>
             </a:fld>
             <a:endParaRPr lang="en-US"/>
           </a:p>
@@ -3934,7 +3934,7 @@
         </p:nvCxnSpPr>
         <p:spPr>
           <a:xfrm flipV="1">
-            <a:off x="10938550" y="4619984"/>
+            <a:off x="10938550" y="4631859"/>
             <a:ext cx="0" cy="1644598"/>
           </a:xfrm>
           <a:prstGeom prst="straightConnector1">
@@ -4196,8 +4196,8 @@
           </a:p>
         </p:txBody>
       </p:sp>
-      <mc:AlternateContent xmlns:mc="http://schemas.openxmlformats.org/markup-compatibility/2006" xmlns:a14="http://schemas.microsoft.com/office/drawing/2010/main">
-        <mc:Choice Requires="a14">
+      <mc:AlternateContent xmlns:mc="http://schemas.openxmlformats.org/markup-compatibility/2006">
+        <mc:Choice xmlns:a14="http://schemas.microsoft.com/office/drawing/2010/main" Requires="a14">
           <p:sp>
             <p:nvSpPr>
               <p:cNvPr id="100" name="Rectangle 99">
@@ -4213,7 +4213,7 @@
             <p:spPr>
               <a:xfrm>
                 <a:off x="8122359" y="8102834"/>
-                <a:ext cx="1882054" cy="425501"/>
+                <a:ext cx="1755416" cy="425501"/>
               </a:xfrm>
               <a:prstGeom prst="rect">
                 <a:avLst/>
@@ -4318,7 +4318,7 @@
                           <a:ea typeface="Calibri" charset="0"/>
                           <a:cs typeface="Calibri" charset="0"/>
                         </a:rPr>
-                        <m:t>⁡[#</m:t>
+                        <m:t>⁡[</m:t>
                       </m:r>
                       <m:sSub>
                         <m:sSubPr>
@@ -4379,7 +4379,7 @@
             </p:txBody>
           </p:sp>
         </mc:Choice>
-        <mc:Fallback xmlns="">
+        <mc:Fallback>
           <p:sp>
             <p:nvSpPr>
               <p:cNvPr id="100" name="Rectangle 99">
@@ -4397,7 +4397,7 @@
             <p:spPr>
               <a:xfrm>
                 <a:off x="8122359" y="8102834"/>
-                <a:ext cx="1882054" cy="425501"/>
+                <a:ext cx="1755416" cy="425501"/>
               </a:xfrm>
               <a:prstGeom prst="rect">
                 <a:avLst/>
@@ -4431,8 +4431,8 @@
           </p:sp>
         </mc:Fallback>
       </mc:AlternateContent>
-      <mc:AlternateContent xmlns:mc="http://schemas.openxmlformats.org/markup-compatibility/2006" xmlns:a14="http://schemas.microsoft.com/office/drawing/2010/main">
-        <mc:Choice Requires="a14">
+      <mc:AlternateContent xmlns:mc="http://schemas.openxmlformats.org/markup-compatibility/2006">
+        <mc:Choice xmlns:a14="http://schemas.microsoft.com/office/drawing/2010/main" Requires="a14">
           <p:sp>
             <p:nvSpPr>
               <p:cNvPr id="101" name="TextBox 100">
@@ -4447,8 +4447,8 @@
             </p:nvSpPr>
             <p:spPr>
               <a:xfrm>
-                <a:off x="14053850" y="4180553"/>
-                <a:ext cx="2066593" cy="307777"/>
+                <a:off x="14053851" y="4180553"/>
+                <a:ext cx="1731914" cy="307777"/>
               </a:xfrm>
               <a:prstGeom prst="rect">
                 <a:avLst/>
@@ -4519,13 +4519,13 @@
                     <a:ea typeface="Calibri" charset="0"/>
                     <a:cs typeface="Calibri" charset="0"/>
                   </a:rPr>
-                  <a:t> to network</a:t>
+                  <a:t> to DFS</a:t>
                 </a:r>
               </a:p>
             </p:txBody>
           </p:sp>
         </mc:Choice>
-        <mc:Fallback xmlns="">
+        <mc:Fallback>
           <p:sp>
             <p:nvSpPr>
               <p:cNvPr id="101" name="TextBox 100">
@@ -4542,8 +4542,8 @@
             </p:nvSpPr>
             <p:spPr>
               <a:xfrm>
-                <a:off x="14053850" y="4180553"/>
-                <a:ext cx="2066593" cy="307777"/>
+                <a:off x="14053851" y="4180553"/>
+                <a:ext cx="1731914" cy="307777"/>
               </a:xfrm>
               <a:prstGeom prst="rect">
                 <a:avLst/>
@@ -4551,7 +4551,7 @@
               <a:blipFill>
                 <a:blip r:embed="rId5"/>
                 <a:stretch>
-                  <a:fillRect l="-1220" b="-15385"/>
+                  <a:fillRect l="-1449" b="-15385"/>
                 </a:stretch>
               </a:blipFill>
               <a:ln>
@@ -5095,8 +5095,8 @@
             </p:nvSpPr>
             <p:spPr>
               <a:xfrm>
-                <a:off x="11206456" y="4800420"/>
-                <a:ext cx="2245726" cy="755976"/>
+                <a:off x="11206455" y="4800420"/>
+                <a:ext cx="2438605" cy="543162"/>
               </a:xfrm>
               <a:prstGeom prst="rect">
                 <a:avLst/>
@@ -5131,7 +5131,7 @@
                     <m:sSub>
                       <m:sSubPr>
                         <m:ctrlPr>
-                          <a:rPr lang="en-GB" sz="1400" b="0" i="0" dirty="0" smtClean="0">
+                          <a:rPr lang="en-GB" sz="1400" b="0" i="1" dirty="0" smtClean="0">
                             <a:latin typeface="Cambria Math" panose="02040503050406030204" pitchFamily="18" charset="0"/>
                             <a:ea typeface="Calibri" charset="0"/>
                             <a:cs typeface="Calibri" charset="0"/>
@@ -5167,20 +5167,13 @@
                     </m:sSub>
                   </m:oMath>
                 </a14:m>
-                <a:endParaRPr lang="en-GB" sz="1400" dirty="0">
-                  <a:latin typeface="Calibri" charset="0"/>
-                  <a:ea typeface="Calibri" charset="0"/>
-                  <a:cs typeface="Calibri" charset="0"/>
-                </a:endParaRPr>
-              </a:p>
-              <a:p>
                 <a:r>
                   <a:rPr lang="en-GB" sz="1400" dirty="0">
                     <a:latin typeface="Calibri" charset="0"/>
                     <a:ea typeface="Calibri" charset="0"/>
                     <a:cs typeface="Calibri" charset="0"/>
                   </a:rPr>
-                  <a:t>(including rewards)</a:t>
+                  <a:t> (including rewards)</a:t>
                 </a:r>
                 <a:endParaRPr lang="en-US" sz="1400" dirty="0">
                   <a:latin typeface="Calibri" charset="0"/>
@@ -5208,8 +5201,8 @@
             </p:nvSpPr>
             <p:spPr>
               <a:xfrm>
-                <a:off x="11206456" y="4800420"/>
-                <a:ext cx="2245726" cy="755976"/>
+                <a:off x="11206455" y="4800420"/>
+                <a:ext cx="2438605" cy="543162"/>
               </a:xfrm>
               <a:prstGeom prst="rect">
                 <a:avLst/>
@@ -5217,7 +5210,7 @@
               <a:blipFill>
                 <a:blip r:embed="rId6"/>
                 <a:stretch>
-                  <a:fillRect l="-559" b="-4839"/>
+                  <a:fillRect l="-515" b="-4444"/>
                 </a:stretch>
               </a:blipFill>
               <a:ln>
@@ -5393,8 +5386,8 @@
           </a:p>
         </p:txBody>
       </p:sp>
-      <mc:AlternateContent xmlns:mc="http://schemas.openxmlformats.org/markup-compatibility/2006" xmlns:a14="http://schemas.microsoft.com/office/drawing/2010/main">
-        <mc:Choice Requires="a14">
+      <mc:AlternateContent xmlns:mc="http://schemas.openxmlformats.org/markup-compatibility/2006">
+        <mc:Choice xmlns:a14="http://schemas.microsoft.com/office/drawing/2010/main" Requires="a14">
           <p:sp>
             <p:nvSpPr>
               <p:cNvPr id="117" name="TextBox 116">
@@ -5409,8 +5402,8 @@
             </p:nvSpPr>
             <p:spPr>
               <a:xfrm>
-                <a:off x="7412017" y="3700198"/>
-                <a:ext cx="2406963" cy="1540806"/>
+                <a:off x="7435870" y="4483664"/>
+                <a:ext cx="2406963" cy="755976"/>
               </a:xfrm>
               <a:prstGeom prst="rect">
                 <a:avLst/>
@@ -5432,216 +5425,71 @@
               </a:bodyPr>
               <a:lstStyle/>
               <a:p>
-                <a:pPr/>
-                <a14:m>
-                  <m:oMathPara xmlns:m="http://schemas.openxmlformats.org/officeDocument/2006/math">
-                    <m:oMathParaPr>
-                      <m:jc m:val="centerGroup"/>
-                    </m:oMathParaPr>
-                    <m:oMath xmlns:m="http://schemas.openxmlformats.org/officeDocument/2006/math">
-                      <m:sSub>
-                        <m:sSubPr>
-                          <m:ctrlPr>
-                            <a:rPr lang="en-US" sz="1400" i="1" smtClean="0">
-                              <a:latin typeface="Cambria Math" panose="02040503050406030204" pitchFamily="18" charset="0"/>
-                              <a:ea typeface="Calibri" charset="0"/>
-                              <a:cs typeface="Calibri" charset="0"/>
-                            </a:rPr>
-                          </m:ctrlPr>
-                        </m:sSubPr>
-                        <m:e>
-                          <m:r>
-                            <a:rPr lang="en-GB" sz="1400" i="1">
-                              <a:latin typeface="Cambria Math" panose="02040503050406030204" pitchFamily="18" charset="0"/>
-                              <a:ea typeface="Calibri" charset="0"/>
-                              <a:cs typeface="Calibri" charset="0"/>
-                            </a:rPr>
-                            <m:t>h</m:t>
-                          </m:r>
-                        </m:e>
-                        <m:sub>
-                          <m:r>
-                            <a:rPr lang="en-GB" sz="1400" i="1">
-                              <a:latin typeface="Cambria Math" panose="02040503050406030204" pitchFamily="18" charset="0"/>
-                              <a:ea typeface="Calibri" charset="0"/>
-                              <a:cs typeface="Calibri" charset="0"/>
-                            </a:rPr>
-                            <m:t>𝑗</m:t>
-                          </m:r>
-                        </m:sub>
-                      </m:sSub>
-                      <m:r>
-                        <a:rPr lang="en-GB" sz="1400" i="1">
-                          <a:latin typeface="Cambria Math" panose="02040503050406030204" pitchFamily="18" charset="0"/>
-                          <a:ea typeface="Calibri" charset="0"/>
-                          <a:cs typeface="Calibri" charset="0"/>
-                        </a:rPr>
-                        <m:t>=</m:t>
-                      </m:r>
-                      <m:r>
-                        <a:rPr lang="en-GB" sz="1400" b="0" i="1" smtClean="0">
-                          <a:latin typeface="Cambria Math" panose="02040503050406030204" pitchFamily="18" charset="0"/>
-                          <a:ea typeface="Calibri" charset="0"/>
-                          <a:cs typeface="Calibri" charset="0"/>
-                        </a:rPr>
-                        <m:t>𝐻</m:t>
-                      </m:r>
-                      <m:d>
-                        <m:dPr>
-                          <m:ctrlPr>
-                            <a:rPr lang="en-GB" sz="1400" i="1">
-                              <a:latin typeface="Cambria Math" panose="02040503050406030204" pitchFamily="18" charset="0"/>
-                              <a:ea typeface="Calibri" charset="0"/>
-                              <a:cs typeface="Calibri" charset="0"/>
-                            </a:rPr>
-                          </m:ctrlPr>
-                        </m:dPr>
-                        <m:e>
-                          <m:r>
-                            <a:rPr lang="en-GB" sz="1400" i="1">
-                              <a:latin typeface="Cambria Math" panose="02040503050406030204" pitchFamily="18" charset="0"/>
-                              <a:ea typeface="Calibri" charset="0"/>
-                              <a:cs typeface="Calibri" charset="0"/>
-                            </a:rPr>
-                            <m:t>∆</m:t>
-                          </m:r>
-                          <m:sSub>
-                            <m:sSubPr>
-                              <m:ctrlPr>
-                                <a:rPr lang="en-GB" sz="1400" i="1">
-                                  <a:latin typeface="Cambria Math" panose="02040503050406030204" pitchFamily="18" charset="0"/>
-                                  <a:ea typeface="Cambria Math" panose="02040503050406030204" pitchFamily="18" charset="0"/>
-                                  <a:cs typeface="Calibri" charset="0"/>
-                                </a:rPr>
-                              </m:ctrlPr>
-                            </m:sSubPr>
-                            <m:e>
-                              <m:r>
-                                <a:rPr lang="en-GB" sz="1400" i="1">
-                                  <a:latin typeface="Cambria Math" panose="02040503050406030204" pitchFamily="18" charset="0"/>
-                                  <a:ea typeface="Cambria Math" panose="02040503050406030204" pitchFamily="18" charset="0"/>
-                                  <a:cs typeface="Calibri" charset="0"/>
-                                </a:rPr>
-                                <m:t>𝐿</m:t>
-                              </m:r>
-                            </m:e>
-                            <m:sub>
-                              <m:r>
-                                <a:rPr lang="en-GB" sz="1400" i="1">
-                                  <a:latin typeface="Cambria Math" panose="02040503050406030204" pitchFamily="18" charset="0"/>
-                                  <a:ea typeface="Cambria Math" panose="02040503050406030204" pitchFamily="18" charset="0"/>
-                                  <a:cs typeface="Calibri" charset="0"/>
-                                </a:rPr>
-                                <m:t>𝑛</m:t>
-                              </m:r>
-                              <m:r>
-                                <a:rPr lang="en-GB" sz="1400" i="1">
-                                  <a:latin typeface="Cambria Math" panose="02040503050406030204" pitchFamily="18" charset="0"/>
-                                  <a:ea typeface="Cambria Math" panose="02040503050406030204" pitchFamily="18" charset="0"/>
-                                  <a:cs typeface="Calibri" charset="0"/>
-                                </a:rPr>
-                                <m:t>,</m:t>
-                              </m:r>
-                              <m:r>
-                                <a:rPr lang="en-GB" sz="1400" i="1">
-                                  <a:latin typeface="Cambria Math" panose="02040503050406030204" pitchFamily="18" charset="0"/>
-                                  <a:ea typeface="Cambria Math" panose="02040503050406030204" pitchFamily="18" charset="0"/>
-                                  <a:cs typeface="Calibri" charset="0"/>
-                                </a:rPr>
-                                <m:t>𝑗</m:t>
-                              </m:r>
-                            </m:sub>
-                          </m:sSub>
-                        </m:e>
-                      </m:d>
-                      <m:r>
-                        <a:rPr lang="en-GB" sz="1400" b="0" i="1" smtClean="0">
-                          <a:latin typeface="Cambria Math" panose="02040503050406030204" pitchFamily="18" charset="0"/>
-                          <a:ea typeface="Cambria Math" panose="02040503050406030204" pitchFamily="18" charset="0"/>
-                          <a:cs typeface="Calibri" charset="0"/>
-                        </a:rPr>
-                        <m:t> || </m:t>
-                      </m:r>
-                      <m:r>
-                        <a:rPr lang="en-GB" sz="1400" i="1">
-                          <a:latin typeface="Cambria Math" panose="02040503050406030204" pitchFamily="18" charset="0"/>
-                          <a:ea typeface="Calibri" charset="0"/>
-                          <a:cs typeface="Calibri" charset="0"/>
-                        </a:rPr>
-                        <m:t>𝐼</m:t>
-                      </m:r>
-                      <m:sSub>
-                        <m:sSubPr>
-                          <m:ctrlPr>
-                            <a:rPr lang="en-GB" sz="1400" i="1">
-                              <a:latin typeface="Cambria Math" panose="02040503050406030204" pitchFamily="18" charset="0"/>
-                              <a:ea typeface="Calibri" charset="0"/>
-                              <a:cs typeface="Calibri" charset="0"/>
-                            </a:rPr>
-                          </m:ctrlPr>
-                        </m:sSubPr>
-                        <m:e>
-                          <m:r>
-                            <a:rPr lang="en-GB" sz="1400" i="1">
-                              <a:latin typeface="Cambria Math" panose="02040503050406030204" pitchFamily="18" charset="0"/>
-                              <a:ea typeface="Calibri" charset="0"/>
-                              <a:cs typeface="Calibri" charset="0"/>
-                            </a:rPr>
-                            <m:t>𝑑</m:t>
-                          </m:r>
-                        </m:e>
-                        <m:sub>
-                          <m:r>
-                            <a:rPr lang="en-GB" sz="1400" i="1">
-                              <a:latin typeface="Cambria Math" panose="02040503050406030204" pitchFamily="18" charset="0"/>
-                              <a:ea typeface="Calibri" charset="0"/>
-                              <a:cs typeface="Calibri" charset="0"/>
-                            </a:rPr>
-                            <m:t>𝑗</m:t>
-                          </m:r>
-                        </m:sub>
-                      </m:sSub>
-                    </m:oMath>
-                  </m:oMathPara>
-                </a14:m>
-                <a:endParaRPr lang="en-US" sz="1400" dirty="0"/>
-              </a:p>
-              <a:p>
-                <a:endParaRPr lang="en-US" sz="1400" dirty="0">
-                  <a:latin typeface="Calibri" panose="020F0502020204030204" pitchFamily="34" charset="0"/>
-                  <a:ea typeface="Calibri" charset="0"/>
-                  <a:cs typeface="Calibri" panose="020F0502020204030204" pitchFamily="34" charset="0"/>
-                </a:endParaRPr>
-              </a:p>
-              <a:p>
-                <a:endParaRPr lang="en-US" sz="800" dirty="0">
-                  <a:latin typeface="Calibri" panose="020F0502020204030204" pitchFamily="34" charset="0"/>
-                  <a:ea typeface="Calibri" charset="0"/>
-                  <a:cs typeface="Calibri" panose="020F0502020204030204" pitchFamily="34" charset="0"/>
-                </a:endParaRPr>
-              </a:p>
-              <a:p>
-                <a:endParaRPr lang="en-US" sz="1400" dirty="0">
-                  <a:latin typeface="Calibri" panose="020F0502020204030204" pitchFamily="34" charset="0"/>
-                  <a:ea typeface="Calibri" charset="0"/>
-                  <a:cs typeface="Calibri" panose="020F0502020204030204" pitchFamily="34" charset="0"/>
-                </a:endParaRPr>
-              </a:p>
-              <a:p>
                 <a:r>
                   <a:rPr lang="en-US" sz="1400" dirty="0">
                     <a:latin typeface="Calibri" panose="020F0502020204030204" pitchFamily="34" charset="0"/>
                     <a:ea typeface="Calibri" charset="0"/>
                     <a:cs typeface="Calibri" panose="020F0502020204030204" pitchFamily="34" charset="0"/>
                   </a:rPr>
-                  <a:t>Local hash of ledger state update computed and broadcast to other producers</a:t>
+                  <a:t>Local hash of ledger state update </a:t>
+                </a:r>
+                <a14:m>
+                  <m:oMath xmlns:m="http://schemas.openxmlformats.org/officeDocument/2006/math">
+                    <m:sSub>
+                      <m:sSubPr>
+                        <m:ctrlPr>
+                          <a:rPr lang="en-US" sz="1400" i="1">
+                            <a:latin typeface="Cambria Math" panose="02040503050406030204" pitchFamily="18" charset="0"/>
+                            <a:ea typeface="Calibri" charset="0"/>
+                            <a:cs typeface="Calibri" charset="0"/>
+                          </a:rPr>
+                        </m:ctrlPr>
+                      </m:sSubPr>
+                      <m:e>
+                        <m:r>
+                          <a:rPr lang="en-GB" sz="1400" i="1">
+                            <a:latin typeface="Cambria Math" panose="02040503050406030204" pitchFamily="18" charset="0"/>
+                            <a:ea typeface="Calibri" charset="0"/>
+                            <a:cs typeface="Calibri" charset="0"/>
+                          </a:rPr>
+                          <m:t>h</m:t>
+                        </m:r>
+                      </m:e>
+                      <m:sub>
+                        <m:r>
+                          <a:rPr lang="en-GB" sz="1400" i="1">
+                            <a:latin typeface="Cambria Math" panose="02040503050406030204" pitchFamily="18" charset="0"/>
+                            <a:ea typeface="Calibri" charset="0"/>
+                            <a:cs typeface="Calibri" charset="0"/>
+                          </a:rPr>
+                          <m:t>𝑗</m:t>
+                        </m:r>
+                      </m:sub>
+                    </m:sSub>
+                    <m:r>
+                      <a:rPr lang="en-GB" sz="1400" i="1">
+                        <a:latin typeface="Cambria Math" panose="02040503050406030204" pitchFamily="18" charset="0"/>
+                        <a:ea typeface="Calibri" charset="0"/>
+                        <a:cs typeface="Calibri" charset="0"/>
+                      </a:rPr>
+                      <m:t> </m:t>
+                    </m:r>
+                  </m:oMath>
+                </a14:m>
+                <a:r>
+                  <a:rPr lang="en-US" sz="1400" dirty="0">
+                    <a:latin typeface="Calibri" panose="020F0502020204030204" pitchFamily="34" charset="0"/>
+                    <a:ea typeface="Calibri" charset="0"/>
+                    <a:cs typeface="Calibri" panose="020F0502020204030204" pitchFamily="34" charset="0"/>
+                  </a:rPr>
+                  <a:t>computed and broadcast to other producers</a:t>
                 </a:r>
                 <a:endParaRPr lang="en-GB" sz="1400" dirty="0"/>
               </a:p>
             </p:txBody>
           </p:sp>
         </mc:Choice>
-        <mc:Fallback xmlns="">
+        <mc:Fallback>
           <p:sp>
             <p:nvSpPr>
               <p:cNvPr id="117" name="TextBox 116">
@@ -5658,8 +5506,8 @@
             </p:nvSpPr>
             <p:spPr>
               <a:xfrm>
-                <a:off x="7412017" y="3700198"/>
-                <a:ext cx="2406963" cy="1540806"/>
+                <a:off x="7435870" y="4483664"/>
+                <a:ext cx="2406963" cy="755976"/>
               </a:xfrm>
               <a:prstGeom prst="rect">
                 <a:avLst/>
@@ -5667,7 +5515,7 @@
               <a:blipFill>
                 <a:blip r:embed="rId7"/>
                 <a:stretch>
-                  <a:fillRect l="-524" b="-1613"/>
+                  <a:fillRect l="-524" b="-4839"/>
                 </a:stretch>
               </a:blipFill>
               <a:ln>
@@ -5793,8 +5641,8 @@
           </a:fontRef>
         </p:style>
       </p:cxnSp>
-      <mc:AlternateContent xmlns:mc="http://schemas.openxmlformats.org/markup-compatibility/2006" xmlns:a14="http://schemas.microsoft.com/office/drawing/2010/main">
-        <mc:Choice Requires="a14">
+      <mc:AlternateContent xmlns:mc="http://schemas.openxmlformats.org/markup-compatibility/2006">
+        <mc:Choice xmlns:a14="http://schemas.microsoft.com/office/drawing/2010/main" Requires="a14">
           <p:sp>
             <p:nvSpPr>
               <p:cNvPr id="120" name="Rectangle 119">
@@ -5809,8 +5657,8 @@
             </p:nvSpPr>
             <p:spPr>
               <a:xfrm>
-                <a:off x="13842912" y="3781319"/>
-                <a:ext cx="1628843" cy="281879"/>
+                <a:off x="13842911" y="3680725"/>
+                <a:ext cx="2803426" cy="354245"/>
               </a:xfrm>
               <a:prstGeom prst="rect">
                 <a:avLst/>
@@ -5993,6 +5841,17 @@
                       </m:e>
                     </m:d>
                     <m:r>
+                      <a:rPr lang="en-GB" sz="1400">
+                        <a:solidFill>
+                          <a:schemeClr val="tx1"/>
+                        </a:solidFill>
+                        <a:latin typeface="Cambria Math" panose="02040503050406030204" pitchFamily="18" charset="0"/>
+                        <a:ea typeface="Calibri" charset="0"/>
+                        <a:cs typeface="Calibri" charset="0"/>
+                      </a:rPr>
+                      <m:t>||</m:t>
+                    </m:r>
+                    <m:r>
                       <a:rPr lang="en-GB" sz="1400" b="0" i="0" smtClean="0">
                         <a:solidFill>
                           <a:schemeClr val="tx1"/>
@@ -6001,12 +5860,12 @@
                         <a:ea typeface="Calibri" charset="0"/>
                         <a:cs typeface="Calibri" charset="0"/>
                       </a:rPr>
-                      <m:t> ||</m:t>
+                      <m:t> #(</m:t>
                     </m:r>
                     <m:sSub>
                       <m:sSubPr>
                         <m:ctrlPr>
-                          <a:rPr lang="en-GB" sz="1400" b="0" i="1" smtClean="0">
+                          <a:rPr lang="en-GB" sz="1400" b="0" i="0" smtClean="0">
                             <a:solidFill>
                               <a:schemeClr val="tx1"/>
                             </a:solidFill>
@@ -6018,7 +5877,114 @@
                       </m:sSubPr>
                       <m:e>
                         <m:r>
+                          <m:rPr>
+                            <m:sty m:val="p"/>
+                          </m:rPr>
                           <a:rPr lang="en-GB" sz="1400" b="0" i="0" smtClean="0">
+                            <a:solidFill>
+                              <a:schemeClr val="tx1"/>
+                            </a:solidFill>
+                            <a:latin typeface="Cambria Math" panose="02040503050406030204" pitchFamily="18" charset="0"/>
+                            <a:ea typeface="Calibri" charset="0"/>
+                            <a:cs typeface="Calibri" charset="0"/>
+                          </a:rPr>
+                          <m:t>L</m:t>
+                        </m:r>
+                      </m:e>
+                      <m:sub>
+                        <m:r>
+                          <m:rPr>
+                            <m:sty m:val="p"/>
+                          </m:rPr>
+                          <a:rPr lang="en-GB" sz="1400" b="0" i="0" smtClean="0">
+                            <a:solidFill>
+                              <a:schemeClr val="tx1"/>
+                            </a:solidFill>
+                            <a:latin typeface="Cambria Math" panose="02040503050406030204" pitchFamily="18" charset="0"/>
+                            <a:ea typeface="Calibri" charset="0"/>
+                            <a:cs typeface="Calibri" charset="0"/>
+                          </a:rPr>
+                          <m:t>n</m:t>
+                        </m:r>
+                      </m:sub>
+                    </m:sSub>
+                    <m:r>
+                      <a:rPr lang="en-GB" sz="1400" b="0" i="0" smtClean="0">
+                        <a:solidFill>
+                          <a:schemeClr val="tx1"/>
+                        </a:solidFill>
+                        <a:latin typeface="Cambria Math" panose="02040503050406030204" pitchFamily="18" charset="0"/>
+                        <a:ea typeface="Calibri" charset="0"/>
+                        <a:cs typeface="Calibri" charset="0"/>
+                      </a:rPr>
+                      <m:t>(</m:t>
+                    </m:r>
+                    <m:r>
+                      <m:rPr>
+                        <m:sty m:val="p"/>
+                      </m:rPr>
+                      <a:rPr lang="en-GB" sz="1400" b="0" i="0" smtClean="0">
+                        <a:solidFill>
+                          <a:schemeClr val="tx1"/>
+                        </a:solidFill>
+                        <a:latin typeface="Cambria Math" panose="02040503050406030204" pitchFamily="18" charset="0"/>
+                        <a:ea typeface="Calibri" charset="0"/>
+                        <a:cs typeface="Calibri" charset="0"/>
+                      </a:rPr>
+                      <m:t>vote</m:t>
+                    </m:r>
+                    <m:r>
+                      <a:rPr lang="en-GB" sz="1400" b="0" i="0" smtClean="0">
+                        <a:solidFill>
+                          <a:schemeClr val="tx1"/>
+                        </a:solidFill>
+                        <a:latin typeface="Cambria Math" panose="02040503050406030204" pitchFamily="18" charset="0"/>
+                        <a:ea typeface="Calibri" charset="0"/>
+                        <a:cs typeface="Calibri" charset="0"/>
+                      </a:rPr>
+                      <m:t>)</m:t>
+                    </m:r>
+                  </m:oMath>
+                </a14:m>
+                <a:r>
+                  <a:rPr lang="en-GB" sz="1400" dirty="0">
+                    <a:solidFill>
+                      <a:schemeClr val="tx1"/>
+                    </a:solidFill>
+                    <a:ea typeface="Calibri" charset="0"/>
+                    <a:cs typeface="Calibri" charset="0"/>
+                  </a:rPr>
+                  <a:t>) </a:t>
+                </a:r>
+                <a14:m>
+                  <m:oMath xmlns:m="http://schemas.openxmlformats.org/officeDocument/2006/math">
+                    <m:r>
+                      <a:rPr lang="en-GB" sz="1400">
+                        <a:solidFill>
+                          <a:schemeClr val="tx1"/>
+                        </a:solidFill>
+                        <a:latin typeface="Cambria Math" panose="02040503050406030204" pitchFamily="18" charset="0"/>
+                        <a:ea typeface="Calibri" charset="0"/>
+                        <a:cs typeface="Calibri" charset="0"/>
+                      </a:rPr>
+                      <m:t>||</m:t>
+                    </m:r>
+                    <m:sSub>
+                      <m:sSubPr>
+                        <m:ctrlPr>
+                          <a:rPr lang="en-GB" sz="1400" i="1">
+                            <a:solidFill>
+                              <a:schemeClr val="tx1"/>
+                            </a:solidFill>
+                            <a:latin typeface="Cambria Math" panose="02040503050406030204" pitchFamily="18" charset="0"/>
+                            <a:ea typeface="Calibri" charset="0"/>
+                            <a:cs typeface="Calibri" charset="0"/>
+                          </a:rPr>
+                        </m:ctrlPr>
+                      </m:sSubPr>
+                      <m:e>
+                        <m:r>
+                          <a:rPr lang="en-GB" sz="1400">
                             <a:solidFill>
                               <a:schemeClr val="tx1"/>
                             </a:solidFill>
@@ -6032,7 +5998,7 @@
                           <m:rPr>
                             <m:sty m:val="p"/>
                           </m:rPr>
-                          <a:rPr lang="en-GB" sz="1400" b="0" i="0" smtClean="0">
+                          <a:rPr lang="en-GB" sz="1400">
                             <a:solidFill>
                               <a:schemeClr val="tx1"/>
                             </a:solidFill>
@@ -6048,7 +6014,7 @@
                           <m:rPr>
                             <m:sty m:val="p"/>
                           </m:rPr>
-                          <a:rPr lang="en-GB" sz="1400" b="0" i="0" smtClean="0">
+                          <a:rPr lang="en-GB" sz="1400">
                             <a:solidFill>
                               <a:schemeClr val="tx1"/>
                             </a:solidFill>
@@ -6076,7 +6042,7 @@
             </p:txBody>
           </p:sp>
         </mc:Choice>
-        <mc:Fallback xmlns="">
+        <mc:Fallback>
           <p:sp>
             <p:nvSpPr>
               <p:cNvPr id="120" name="Rectangle 119">
@@ -6093,8 +6059,8 @@
             </p:nvSpPr>
             <p:spPr>
               <a:xfrm>
-                <a:off x="13842912" y="3781319"/>
-                <a:ext cx="1628843" cy="281879"/>
+                <a:off x="13842911" y="3680725"/>
+                <a:ext cx="2803426" cy="354245"/>
               </a:xfrm>
               <a:prstGeom prst="rect">
                 <a:avLst/>
@@ -6102,7 +6068,7 @@
               <a:blipFill>
                 <a:blip r:embed="rId8"/>
                 <a:stretch>
-                  <a:fillRect b="-8333"/>
+                  <a:fillRect b="-3333"/>
                 </a:stretch>
               </a:blipFill>
               <a:ln w="9525">
@@ -7334,8 +7300,8 @@
         </p:nvCxnSpPr>
         <p:spPr>
           <a:xfrm rot="5400000">
-            <a:off x="8097816" y="6084860"/>
-            <a:ext cx="4137322" cy="324128"/>
+            <a:off x="8034499" y="6021540"/>
+            <a:ext cx="4137322" cy="450769"/>
           </a:xfrm>
           <a:prstGeom prst="bentConnector2">
             <a:avLst/>
@@ -8041,186 +8007,6 @@
           </p:sp>
         </mc:Fallback>
       </mc:AlternateContent>
-      <mc:AlternateContent xmlns:mc="http://schemas.openxmlformats.org/markup-compatibility/2006" xmlns:a14="http://schemas.microsoft.com/office/drawing/2010/main">
-        <mc:Choice Requires="a14">
-          <p:sp>
-            <p:nvSpPr>
-              <p:cNvPr id="144" name="Rectangle 143">
-                <a:extLst>
-                  <a:ext uri="{FF2B5EF4-FFF2-40B4-BE49-F238E27FC236}">
-                    <a16:creationId xmlns:a16="http://schemas.microsoft.com/office/drawing/2014/main" id="{835850DB-D8B1-0F40-85E7-1C18AFC8D26A}"/>
-                  </a:ext>
-                </a:extLst>
-              </p:cNvPr>
-              <p:cNvSpPr/>
-              <p:nvPr/>
-            </p:nvSpPr>
-            <p:spPr>
-              <a:xfrm>
-                <a:off x="8396769" y="4118495"/>
-                <a:ext cx="475515" cy="325089"/>
-              </a:xfrm>
-              <a:prstGeom prst="rect">
-                <a:avLst/>
-              </a:prstGeom>
-            </p:spPr>
-            <p:txBody>
-              <a:bodyPr wrap="none">
-                <a:spAutoFit/>
-              </a:bodyPr>
-              <a:lstStyle/>
-              <a:p>
-                <a:pPr/>
-                <a14:m>
-                  <m:oMathPara xmlns:m="http://schemas.openxmlformats.org/officeDocument/2006/math">
-                    <m:oMathParaPr>
-                      <m:jc m:val="centerGroup"/>
-                    </m:oMathParaPr>
-                    <m:oMath xmlns:m="http://schemas.openxmlformats.org/officeDocument/2006/math">
-                      <m:sSub>
-                        <m:sSubPr>
-                          <m:ctrlPr>
-                            <a:rPr lang="en-US" sz="1400" i="1">
-                              <a:latin typeface="Cambria Math" panose="02040503050406030204" pitchFamily="18" charset="0"/>
-                              <a:ea typeface="Calibri" charset="0"/>
-                              <a:cs typeface="Calibri" charset="0"/>
-                            </a:rPr>
-                          </m:ctrlPr>
-                        </m:sSubPr>
-                        <m:e>
-                          <m:r>
-                            <a:rPr lang="en-GB" sz="1400" i="1">
-                              <a:latin typeface="Cambria Math" panose="02040503050406030204" pitchFamily="18" charset="0"/>
-                              <a:ea typeface="Calibri" charset="0"/>
-                              <a:cs typeface="Calibri" charset="0"/>
-                            </a:rPr>
-                            <m:t>h</m:t>
-                          </m:r>
-                        </m:e>
-                        <m:sub>
-                          <m:r>
-                            <a:rPr lang="en-GB" sz="1400" i="1" smtClean="0">
-                              <a:latin typeface="Cambria Math" panose="02040503050406030204" pitchFamily="18" charset="0"/>
-                              <a:ea typeface="Cambria Math" panose="02040503050406030204" pitchFamily="18" charset="0"/>
-                              <a:cs typeface="Calibri" charset="0"/>
-                            </a:rPr>
-                            <m:t>∆</m:t>
-                          </m:r>
-                          <m:r>
-                            <a:rPr lang="en-GB" sz="1400" i="1">
-                              <a:latin typeface="Cambria Math" panose="02040503050406030204" pitchFamily="18" charset="0"/>
-                              <a:ea typeface="Calibri" charset="0"/>
-                              <a:cs typeface="Calibri" charset="0"/>
-                            </a:rPr>
-                            <m:t>𝑗</m:t>
-                          </m:r>
-                        </m:sub>
-                      </m:sSub>
-                    </m:oMath>
-                  </m:oMathPara>
-                </a14:m>
-                <a:endParaRPr lang="en-US" sz="1400" dirty="0"/>
-              </a:p>
-            </p:txBody>
-          </p:sp>
-        </mc:Choice>
-        <mc:Fallback xmlns="">
-          <p:sp>
-            <p:nvSpPr>
-              <p:cNvPr id="144" name="Rectangle 143">
-                <a:extLst>
-                  <a:ext uri="{FF2B5EF4-FFF2-40B4-BE49-F238E27FC236}">
-                    <a16:creationId xmlns:a16="http://schemas.microsoft.com/office/drawing/2014/main" id="{835850DB-D8B1-0F40-85E7-1C18AFC8D26A}"/>
-                  </a:ext>
-                </a:extLst>
-              </p:cNvPr>
-              <p:cNvSpPr>
-                <a:spLocks noRot="1" noChangeAspect="1" noMove="1" noResize="1" noEditPoints="1" noAdjustHandles="1" noChangeArrowheads="1" noChangeShapeType="1" noTextEdit="1"/>
-              </p:cNvSpPr>
-              <p:nvPr/>
-            </p:nvSpPr>
-            <p:spPr>
-              <a:xfrm>
-                <a:off x="8396769" y="4118495"/>
-                <a:ext cx="475515" cy="325089"/>
-              </a:xfrm>
-              <a:prstGeom prst="rect">
-                <a:avLst/>
-              </a:prstGeom>
-              <a:blipFill>
-                <a:blip r:embed="rId18"/>
-                <a:stretch>
-                  <a:fillRect/>
-                </a:stretch>
-              </a:blipFill>
-            </p:spPr>
-            <p:txBody>
-              <a:bodyPr/>
-              <a:lstStyle/>
-              <a:p>
-                <a:r>
-                  <a:rPr lang="en-US">
-                    <a:noFill/>
-                  </a:rPr>
-                  <a:t> </a:t>
-                </a:r>
-              </a:p>
-            </p:txBody>
-          </p:sp>
-        </mc:Fallback>
-      </mc:AlternateContent>
-      <p:sp>
-        <p:nvSpPr>
-          <p:cNvPr id="145" name="Right Brace 144">
-            <a:extLst>
-              <a:ext uri="{FF2B5EF4-FFF2-40B4-BE49-F238E27FC236}">
-                <a16:creationId xmlns:a16="http://schemas.microsoft.com/office/drawing/2014/main" id="{2B896533-BE99-0241-B84E-503629B132C1}"/>
-              </a:ext>
-            </a:extLst>
-          </p:cNvPr>
-          <p:cNvSpPr/>
-          <p:nvPr/>
-        </p:nvSpPr>
-        <p:spPr>
-          <a:xfrm rot="5400000">
-            <a:off x="8493861" y="3751465"/>
-            <a:ext cx="135688" cy="651977"/>
-          </a:xfrm>
-          <a:prstGeom prst="rightBrace">
-            <a:avLst>
-              <a:gd name="adj1" fmla="val 36448"/>
-              <a:gd name="adj2" fmla="val 50000"/>
-            </a:avLst>
-          </a:prstGeom>
-          <a:ln>
-            <a:solidFill>
-              <a:schemeClr val="tx1"/>
-            </a:solidFill>
-          </a:ln>
-        </p:spPr>
-        <p:style>
-          <a:lnRef idx="1">
-            <a:schemeClr val="accent1"/>
-          </a:lnRef>
-          <a:fillRef idx="0">
-            <a:schemeClr val="accent1"/>
-          </a:fillRef>
-          <a:effectRef idx="0">
-            <a:schemeClr val="accent1"/>
-          </a:effectRef>
-          <a:fontRef idx="minor">
-            <a:schemeClr val="tx1"/>
-          </a:fontRef>
-        </p:style>
-        <p:txBody>
-          <a:bodyPr rtlCol="0" anchor="ctr"/>
-          <a:lstStyle/>
-          <a:p>
-            <a:pPr algn="ctr"/>
-            <a:endParaRPr lang="en-US"/>
-          </a:p>
-        </p:txBody>
-      </p:sp>
       <p:sp>
         <p:nvSpPr>
           <p:cNvPr id="146" name="Right Brace 145">
@@ -8235,8 +8021,8 @@
         </p:nvSpPr>
         <p:spPr>
           <a:xfrm rot="16200000">
-            <a:off x="10213061" y="6030296"/>
-            <a:ext cx="471262" cy="747379"/>
+            <a:off x="10225883" y="6017475"/>
+            <a:ext cx="471262" cy="773021"/>
           </a:xfrm>
           <a:prstGeom prst="rightBrace">
             <a:avLst>
@@ -8275,8 +8061,8 @@
           </a:p>
         </p:txBody>
       </p:sp>
-      <mc:AlternateContent xmlns:mc="http://schemas.openxmlformats.org/markup-compatibility/2006">
-        <mc:Choice xmlns:a14="http://schemas.microsoft.com/office/drawing/2010/main" Requires="a14">
+      <mc:AlternateContent xmlns:mc="http://schemas.openxmlformats.org/markup-compatibility/2006" xmlns:a14="http://schemas.microsoft.com/office/drawing/2010/main">
+        <mc:Choice Requires="a14">
           <p:sp>
             <p:nvSpPr>
               <p:cNvPr id="147" name="TextBox 146">
@@ -8381,7 +8167,7 @@
             </p:txBody>
           </p:sp>
         </mc:Choice>
-        <mc:Fallback>
+        <mc:Fallback xmlns="">
           <p:sp>
             <p:nvSpPr>
               <p:cNvPr id="147" name="TextBox 146">
@@ -8499,7 +8285,7 @@
         </p:nvCxnSpPr>
         <p:spPr>
           <a:xfrm flipV="1">
-            <a:off x="12802578" y="6044799"/>
+            <a:off x="12790703" y="6056674"/>
             <a:ext cx="0" cy="215849"/>
           </a:xfrm>
           <a:prstGeom prst="straightConnector1">
@@ -9269,14 +9055,15 @@
             </a:extLst>
           </p:cNvPr>
           <p:cNvCxnSpPr>
+            <a:cxnSpLocks/>
             <a:stCxn id="146" idx="1"/>
           </p:cNvCxnSpPr>
           <p:nvPr/>
         </p:nvCxnSpPr>
         <p:spPr>
-          <a:xfrm flipV="1">
+          <a:xfrm flipH="1" flipV="1">
             <a:off x="10448693" y="4178261"/>
-            <a:ext cx="0" cy="1990094"/>
+            <a:ext cx="12822" cy="1990094"/>
           </a:xfrm>
           <a:prstGeom prst="straightConnector1">
             <a:avLst/>
@@ -9305,6 +9092,495 @@
           </a:fontRef>
         </p:style>
       </p:cxnSp>
+      <p:sp>
+        <p:nvSpPr>
+          <p:cNvPr id="6" name="Rectangle 5">
+            <a:extLst>
+              <a:ext uri="{FF2B5EF4-FFF2-40B4-BE49-F238E27FC236}">
+                <a16:creationId xmlns:a16="http://schemas.microsoft.com/office/drawing/2014/main" id="{00984851-85A1-B74F-AF52-3E8031E16CC5}"/>
+              </a:ext>
+            </a:extLst>
+          </p:cNvPr>
+          <p:cNvSpPr/>
+          <p:nvPr/>
+        </p:nvSpPr>
+        <p:spPr>
+          <a:xfrm>
+            <a:off x="7732071" y="3687812"/>
+            <a:ext cx="1899210" cy="717324"/>
+          </a:xfrm>
+          <a:prstGeom prst="rect">
+            <a:avLst/>
+          </a:prstGeom>
+          <a:solidFill>
+            <a:schemeClr val="bg1">
+              <a:lumMod val="85000"/>
+            </a:schemeClr>
+          </a:solidFill>
+          <a:ln>
+            <a:solidFill>
+              <a:schemeClr val="accent6">
+                <a:lumMod val="50000"/>
+              </a:schemeClr>
+            </a:solidFill>
+          </a:ln>
+        </p:spPr>
+        <p:style>
+          <a:lnRef idx="2">
+            <a:schemeClr val="accent1">
+              <a:shade val="50000"/>
+            </a:schemeClr>
+          </a:lnRef>
+          <a:fillRef idx="1">
+            <a:schemeClr val="accent1"/>
+          </a:fillRef>
+          <a:effectRef idx="0">
+            <a:schemeClr val="accent1"/>
+          </a:effectRef>
+          <a:fontRef idx="minor">
+            <a:schemeClr val="lt1"/>
+          </a:fontRef>
+        </p:style>
+        <p:txBody>
+          <a:bodyPr rtlCol="0" anchor="ctr"/>
+          <a:lstStyle/>
+          <a:p>
+            <a:pPr algn="ctr"/>
+            <a:endParaRPr lang="en-GB"/>
+          </a:p>
+        </p:txBody>
+      </p:sp>
+      <mc:AlternateContent xmlns:mc="http://schemas.openxmlformats.org/markup-compatibility/2006">
+        <mc:Choice xmlns:a14="http://schemas.microsoft.com/office/drawing/2010/main" Requires="a14">
+          <p:sp>
+            <p:nvSpPr>
+              <p:cNvPr id="144" name="Rectangle 143">
+                <a:extLst>
+                  <a:ext uri="{FF2B5EF4-FFF2-40B4-BE49-F238E27FC236}">
+                    <a16:creationId xmlns:a16="http://schemas.microsoft.com/office/drawing/2014/main" id="{835850DB-D8B1-0F40-85E7-1C18AFC8D26A}"/>
+                  </a:ext>
+                </a:extLst>
+              </p:cNvPr>
+              <p:cNvSpPr/>
+              <p:nvPr/>
+            </p:nvSpPr>
+            <p:spPr>
+              <a:xfrm>
+                <a:off x="8396769" y="4118495"/>
+                <a:ext cx="475515" cy="325089"/>
+              </a:xfrm>
+              <a:prstGeom prst="rect">
+                <a:avLst/>
+              </a:prstGeom>
+            </p:spPr>
+            <p:txBody>
+              <a:bodyPr wrap="none">
+                <a:spAutoFit/>
+              </a:bodyPr>
+              <a:lstStyle/>
+              <a:p>
+                <a:pPr/>
+                <a14:m>
+                  <m:oMathPara xmlns:m="http://schemas.openxmlformats.org/officeDocument/2006/math">
+                    <m:oMathParaPr>
+                      <m:jc m:val="centerGroup"/>
+                    </m:oMathParaPr>
+                    <m:oMath xmlns:m="http://schemas.openxmlformats.org/officeDocument/2006/math">
+                      <m:sSub>
+                        <m:sSubPr>
+                          <m:ctrlPr>
+                            <a:rPr lang="en-US" sz="1400" i="1">
+                              <a:latin typeface="Cambria Math" panose="02040503050406030204" pitchFamily="18" charset="0"/>
+                              <a:ea typeface="Calibri" charset="0"/>
+                              <a:cs typeface="Calibri" charset="0"/>
+                            </a:rPr>
+                          </m:ctrlPr>
+                        </m:sSubPr>
+                        <m:e>
+                          <m:r>
+                            <a:rPr lang="en-GB" sz="1400" i="1">
+                              <a:latin typeface="Cambria Math" panose="02040503050406030204" pitchFamily="18" charset="0"/>
+                              <a:ea typeface="Calibri" charset="0"/>
+                              <a:cs typeface="Calibri" charset="0"/>
+                            </a:rPr>
+                            <m:t>h</m:t>
+                          </m:r>
+                        </m:e>
+                        <m:sub>
+                          <m:r>
+                            <a:rPr lang="en-GB" sz="1400" i="1" smtClean="0">
+                              <a:latin typeface="Cambria Math" panose="02040503050406030204" pitchFamily="18" charset="0"/>
+                              <a:ea typeface="Cambria Math" panose="02040503050406030204" pitchFamily="18" charset="0"/>
+                              <a:cs typeface="Calibri" charset="0"/>
+                            </a:rPr>
+                            <m:t>∆</m:t>
+                          </m:r>
+                          <m:r>
+                            <a:rPr lang="en-GB" sz="1400" i="1">
+                              <a:latin typeface="Cambria Math" panose="02040503050406030204" pitchFamily="18" charset="0"/>
+                              <a:ea typeface="Calibri" charset="0"/>
+                              <a:cs typeface="Calibri" charset="0"/>
+                            </a:rPr>
+                            <m:t>𝑗</m:t>
+                          </m:r>
+                        </m:sub>
+                      </m:sSub>
+                    </m:oMath>
+                  </m:oMathPara>
+                </a14:m>
+                <a:endParaRPr lang="en-US" sz="1400" dirty="0"/>
+              </a:p>
+            </p:txBody>
+          </p:sp>
+        </mc:Choice>
+        <mc:Fallback>
+          <p:sp>
+            <p:nvSpPr>
+              <p:cNvPr id="144" name="Rectangle 143">
+                <a:extLst>
+                  <a:ext uri="{FF2B5EF4-FFF2-40B4-BE49-F238E27FC236}">
+                    <a16:creationId xmlns:a16="http://schemas.microsoft.com/office/drawing/2014/main" id="{835850DB-D8B1-0F40-85E7-1C18AFC8D26A}"/>
+                  </a:ext>
+                </a:extLst>
+              </p:cNvPr>
+              <p:cNvSpPr>
+                <a:spLocks noRot="1" noChangeAspect="1" noMove="1" noResize="1" noEditPoints="1" noAdjustHandles="1" noChangeArrowheads="1" noChangeShapeType="1" noTextEdit="1"/>
+              </p:cNvSpPr>
+              <p:nvPr/>
+            </p:nvSpPr>
+            <p:spPr>
+              <a:xfrm>
+                <a:off x="8396769" y="4118495"/>
+                <a:ext cx="475515" cy="325089"/>
+              </a:xfrm>
+              <a:prstGeom prst="rect">
+                <a:avLst/>
+              </a:prstGeom>
+              <a:blipFill>
+                <a:blip r:embed="rId23"/>
+                <a:stretch>
+                  <a:fillRect/>
+                </a:stretch>
+              </a:blipFill>
+            </p:spPr>
+            <p:txBody>
+              <a:bodyPr/>
+              <a:lstStyle/>
+              <a:p>
+                <a:r>
+                  <a:rPr lang="en-US">
+                    <a:noFill/>
+                  </a:rPr>
+                  <a:t> </a:t>
+                </a:r>
+              </a:p>
+            </p:txBody>
+          </p:sp>
+        </mc:Fallback>
+      </mc:AlternateContent>
+      <mc:AlternateContent xmlns:mc="http://schemas.openxmlformats.org/markup-compatibility/2006">
+        <mc:Choice xmlns:a14="http://schemas.microsoft.com/office/drawing/2010/main" Requires="a14">
+          <p:sp>
+            <p:nvSpPr>
+              <p:cNvPr id="5" name="Rectangle 4">
+                <a:extLst>
+                  <a:ext uri="{FF2B5EF4-FFF2-40B4-BE49-F238E27FC236}">
+                    <a16:creationId xmlns:a16="http://schemas.microsoft.com/office/drawing/2014/main" id="{F9FA9958-0545-8C40-AB59-D04CC3E665D0}"/>
+                  </a:ext>
+                </a:extLst>
+              </p:cNvPr>
+              <p:cNvSpPr/>
+              <p:nvPr/>
+            </p:nvSpPr>
+            <p:spPr>
+              <a:xfrm>
+                <a:off x="7421022" y="3690907"/>
+                <a:ext cx="2460730" cy="376000"/>
+              </a:xfrm>
+              <a:prstGeom prst="rect">
+                <a:avLst/>
+              </a:prstGeom>
+            </p:spPr>
+            <p:txBody>
+              <a:bodyPr wrap="square">
+                <a:spAutoFit/>
+              </a:bodyPr>
+              <a:lstStyle/>
+              <a:p>
+                <a:pPr/>
+                <a14:m>
+                  <m:oMathPara xmlns:m="http://schemas.openxmlformats.org/officeDocument/2006/math">
+                    <m:oMathParaPr>
+                      <m:jc m:val="centerGroup"/>
+                    </m:oMathParaPr>
+                    <m:oMath xmlns:m="http://schemas.openxmlformats.org/officeDocument/2006/math">
+                      <m:sSub>
+                        <m:sSubPr>
+                          <m:ctrlPr>
+                            <a:rPr lang="en-US" sz="1600" i="1">
+                              <a:latin typeface="Cambria Math" panose="02040503050406030204" pitchFamily="18" charset="0"/>
+                              <a:ea typeface="Calibri" charset="0"/>
+                              <a:cs typeface="Calibri" charset="0"/>
+                            </a:rPr>
+                          </m:ctrlPr>
+                        </m:sSubPr>
+                        <m:e>
+                          <m:r>
+                            <a:rPr lang="en-GB" sz="1600" i="1">
+                              <a:latin typeface="Cambria Math" panose="02040503050406030204" pitchFamily="18" charset="0"/>
+                              <a:ea typeface="Calibri" charset="0"/>
+                              <a:cs typeface="Calibri" charset="0"/>
+                            </a:rPr>
+                            <m:t>h</m:t>
+                          </m:r>
+                        </m:e>
+                        <m:sub>
+                          <m:r>
+                            <a:rPr lang="en-GB" sz="1600" i="1">
+                              <a:latin typeface="Cambria Math" panose="02040503050406030204" pitchFamily="18" charset="0"/>
+                              <a:ea typeface="Calibri" charset="0"/>
+                              <a:cs typeface="Calibri" charset="0"/>
+                            </a:rPr>
+                            <m:t>𝑗</m:t>
+                          </m:r>
+                        </m:sub>
+                      </m:sSub>
+                      <m:r>
+                        <a:rPr lang="en-GB" sz="1600" i="1">
+                          <a:latin typeface="Cambria Math" panose="02040503050406030204" pitchFamily="18" charset="0"/>
+                          <a:ea typeface="Calibri" charset="0"/>
+                          <a:cs typeface="Calibri" charset="0"/>
+                        </a:rPr>
+                        <m:t>=</m:t>
+                      </m:r>
+                      <m:r>
+                        <a:rPr lang="en-GB" sz="1600" i="1">
+                          <a:latin typeface="Cambria Math" panose="02040503050406030204" pitchFamily="18" charset="0"/>
+                          <a:ea typeface="Calibri" charset="0"/>
+                          <a:cs typeface="Calibri" charset="0"/>
+                        </a:rPr>
+                        <m:t>𝐻</m:t>
+                      </m:r>
+                      <m:d>
+                        <m:dPr>
+                          <m:ctrlPr>
+                            <a:rPr lang="en-GB" sz="1600" i="1">
+                              <a:latin typeface="Cambria Math" panose="02040503050406030204" pitchFamily="18" charset="0"/>
+                              <a:ea typeface="Calibri" charset="0"/>
+                              <a:cs typeface="Calibri" charset="0"/>
+                            </a:rPr>
+                          </m:ctrlPr>
+                        </m:dPr>
+                        <m:e>
+                          <m:r>
+                            <a:rPr lang="en-GB" sz="1600" i="1">
+                              <a:latin typeface="Cambria Math" panose="02040503050406030204" pitchFamily="18" charset="0"/>
+                              <a:ea typeface="Calibri" charset="0"/>
+                              <a:cs typeface="Calibri" charset="0"/>
+                            </a:rPr>
+                            <m:t>∆</m:t>
+                          </m:r>
+                          <m:sSub>
+                            <m:sSubPr>
+                              <m:ctrlPr>
+                                <a:rPr lang="en-GB" sz="1600" i="1">
+                                  <a:latin typeface="Cambria Math" panose="02040503050406030204" pitchFamily="18" charset="0"/>
+                                  <a:ea typeface="Cambria Math" panose="02040503050406030204" pitchFamily="18" charset="0"/>
+                                  <a:cs typeface="Calibri" charset="0"/>
+                                </a:rPr>
+                              </m:ctrlPr>
+                            </m:sSubPr>
+                            <m:e>
+                              <m:r>
+                                <a:rPr lang="en-GB" sz="1600" i="1">
+                                  <a:latin typeface="Cambria Math" panose="02040503050406030204" pitchFamily="18" charset="0"/>
+                                  <a:ea typeface="Cambria Math" panose="02040503050406030204" pitchFamily="18" charset="0"/>
+                                  <a:cs typeface="Calibri" charset="0"/>
+                                </a:rPr>
+                                <m:t>𝐿</m:t>
+                              </m:r>
+                            </m:e>
+                            <m:sub>
+                              <m:r>
+                                <a:rPr lang="en-GB" sz="1600" i="1">
+                                  <a:latin typeface="Cambria Math" panose="02040503050406030204" pitchFamily="18" charset="0"/>
+                                  <a:ea typeface="Cambria Math" panose="02040503050406030204" pitchFamily="18" charset="0"/>
+                                  <a:cs typeface="Calibri" charset="0"/>
+                                </a:rPr>
+                                <m:t>𝑛</m:t>
+                              </m:r>
+                              <m:r>
+                                <a:rPr lang="en-GB" sz="1600" i="1">
+                                  <a:latin typeface="Cambria Math" panose="02040503050406030204" pitchFamily="18" charset="0"/>
+                                  <a:ea typeface="Cambria Math" panose="02040503050406030204" pitchFamily="18" charset="0"/>
+                                  <a:cs typeface="Calibri" charset="0"/>
+                                </a:rPr>
+                                <m:t>,</m:t>
+                              </m:r>
+                              <m:r>
+                                <a:rPr lang="en-GB" sz="1600" i="1">
+                                  <a:latin typeface="Cambria Math" panose="02040503050406030204" pitchFamily="18" charset="0"/>
+                                  <a:ea typeface="Cambria Math" panose="02040503050406030204" pitchFamily="18" charset="0"/>
+                                  <a:cs typeface="Calibri" charset="0"/>
+                                </a:rPr>
+                                <m:t>𝑗</m:t>
+                              </m:r>
+                            </m:sub>
+                          </m:sSub>
+                        </m:e>
+                      </m:d>
+                      <m:r>
+                        <a:rPr lang="en-GB" sz="1600" i="1">
+                          <a:latin typeface="Cambria Math" panose="02040503050406030204" pitchFamily="18" charset="0"/>
+                          <a:ea typeface="Cambria Math" panose="02040503050406030204" pitchFamily="18" charset="0"/>
+                          <a:cs typeface="Calibri" charset="0"/>
+                        </a:rPr>
+                        <m:t> || </m:t>
+                      </m:r>
+                      <m:r>
+                        <a:rPr lang="en-GB" sz="1600" i="1">
+                          <a:latin typeface="Cambria Math" panose="02040503050406030204" pitchFamily="18" charset="0"/>
+                          <a:ea typeface="Calibri" charset="0"/>
+                          <a:cs typeface="Calibri" charset="0"/>
+                        </a:rPr>
+                        <m:t>𝐼</m:t>
+                      </m:r>
+                      <m:sSub>
+                        <m:sSubPr>
+                          <m:ctrlPr>
+                            <a:rPr lang="en-GB" sz="1600" i="1">
+                              <a:latin typeface="Cambria Math" panose="02040503050406030204" pitchFamily="18" charset="0"/>
+                              <a:ea typeface="Calibri" charset="0"/>
+                              <a:cs typeface="Calibri" charset="0"/>
+                            </a:rPr>
+                          </m:ctrlPr>
+                        </m:sSubPr>
+                        <m:e>
+                          <m:r>
+                            <a:rPr lang="en-GB" sz="1600" i="1">
+                              <a:latin typeface="Cambria Math" panose="02040503050406030204" pitchFamily="18" charset="0"/>
+                              <a:ea typeface="Calibri" charset="0"/>
+                              <a:cs typeface="Calibri" charset="0"/>
+                            </a:rPr>
+                            <m:t>𝑑</m:t>
+                          </m:r>
+                        </m:e>
+                        <m:sub>
+                          <m:r>
+                            <a:rPr lang="en-GB" sz="1600" i="1">
+                              <a:latin typeface="Cambria Math" panose="02040503050406030204" pitchFamily="18" charset="0"/>
+                              <a:ea typeface="Calibri" charset="0"/>
+                              <a:cs typeface="Calibri" charset="0"/>
+                            </a:rPr>
+                            <m:t>𝑗</m:t>
+                          </m:r>
+                        </m:sub>
+                      </m:sSub>
+                    </m:oMath>
+                  </m:oMathPara>
+                </a14:m>
+                <a:endParaRPr lang="en-US" sz="1600" dirty="0"/>
+              </a:p>
+            </p:txBody>
+          </p:sp>
+        </mc:Choice>
+        <mc:Fallback>
+          <p:sp>
+            <p:nvSpPr>
+              <p:cNvPr id="5" name="Rectangle 4">
+                <a:extLst>
+                  <a:ext uri="{FF2B5EF4-FFF2-40B4-BE49-F238E27FC236}">
+                    <a16:creationId xmlns:a16="http://schemas.microsoft.com/office/drawing/2014/main" id="{F9FA9958-0545-8C40-AB59-D04CC3E665D0}"/>
+                  </a:ext>
+                </a:extLst>
+              </p:cNvPr>
+              <p:cNvSpPr>
+                <a:spLocks noRot="1" noChangeAspect="1" noMove="1" noResize="1" noEditPoints="1" noAdjustHandles="1" noChangeArrowheads="1" noChangeShapeType="1" noTextEdit="1"/>
+              </p:cNvSpPr>
+              <p:nvPr/>
+            </p:nvSpPr>
+            <p:spPr>
+              <a:xfrm>
+                <a:off x="7421022" y="3690907"/>
+                <a:ext cx="2460730" cy="376000"/>
+              </a:xfrm>
+              <a:prstGeom prst="rect">
+                <a:avLst/>
+              </a:prstGeom>
+              <a:blipFill>
+                <a:blip r:embed="rId24"/>
+                <a:stretch>
+                  <a:fillRect b="-10000"/>
+                </a:stretch>
+              </a:blipFill>
+            </p:spPr>
+            <p:txBody>
+              <a:bodyPr/>
+              <a:lstStyle/>
+              <a:p>
+                <a:r>
+                  <a:rPr lang="en-US">
+                    <a:noFill/>
+                  </a:rPr>
+                  <a:t> </a:t>
+                </a:r>
+              </a:p>
+            </p:txBody>
+          </p:sp>
+        </mc:Fallback>
+      </mc:AlternateContent>
+      <p:sp>
+        <p:nvSpPr>
+          <p:cNvPr id="145" name="Right Brace 144">
+            <a:extLst>
+              <a:ext uri="{FF2B5EF4-FFF2-40B4-BE49-F238E27FC236}">
+                <a16:creationId xmlns:a16="http://schemas.microsoft.com/office/drawing/2014/main" id="{2B896533-BE99-0241-B84E-503629B132C1}"/>
+              </a:ext>
+            </a:extLst>
+          </p:cNvPr>
+          <p:cNvSpPr/>
+          <p:nvPr/>
+        </p:nvSpPr>
+        <p:spPr>
+          <a:xfrm rot="5400000">
+            <a:off x="8493861" y="3751465"/>
+            <a:ext cx="135688" cy="651977"/>
+          </a:xfrm>
+          <a:prstGeom prst="rightBrace">
+            <a:avLst>
+              <a:gd name="adj1" fmla="val 36448"/>
+              <a:gd name="adj2" fmla="val 50000"/>
+            </a:avLst>
+          </a:prstGeom>
+          <a:ln>
+            <a:solidFill>
+              <a:schemeClr val="tx1"/>
+            </a:solidFill>
+          </a:ln>
+        </p:spPr>
+        <p:style>
+          <a:lnRef idx="1">
+            <a:schemeClr val="accent1"/>
+          </a:lnRef>
+          <a:fillRef idx="0">
+            <a:schemeClr val="accent1"/>
+          </a:fillRef>
+          <a:effectRef idx="0">
+            <a:schemeClr val="accent1"/>
+          </a:effectRef>
+          <a:fontRef idx="minor">
+            <a:schemeClr val="tx1"/>
+          </a:fontRef>
+        </p:style>
+        <p:txBody>
+          <a:bodyPr rtlCol="0" anchor="ctr"/>
+          <a:lstStyle/>
+          <a:p>
+            <a:pPr algn="ctr"/>
+            <a:endParaRPr lang="en-US"/>
+          </a:p>
+        </p:txBody>
+      </p:sp>
     </p:spTree>
     <p:extLst>
       <p:ext uri="{BB962C8B-B14F-4D97-AF65-F5344CB8AC3E}">
@@ -15327,10 +15603,10 @@
       </p:grpSpPr>
       <p:pic>
         <p:nvPicPr>
-          <p:cNvPr id="4" name="Picture 3" descr="A screenshot of a social media post&#10;&#10;Description automatically generated">
+          <p:cNvPr id="3" name="Picture 2" descr="A screenshot of a computer&#10;&#10;Description automatically generated">
             <a:extLst>
               <a:ext uri="{FF2B5EF4-FFF2-40B4-BE49-F238E27FC236}">
-                <a16:creationId xmlns:a16="http://schemas.microsoft.com/office/drawing/2014/main" id="{D681B31A-6B2E-D941-9734-EE1EB232060C}"/>
+                <a16:creationId xmlns:a16="http://schemas.microsoft.com/office/drawing/2014/main" id="{CFF746D2-0008-384E-95A0-208A5E5DC54D}"/>
               </a:ext>
             </a:extLst>
           </p:cNvPr>
@@ -15341,13 +15617,13 @@
         </p:nvPicPr>
         <p:blipFill rotWithShape="1">
           <a:blip r:embed="rId2"/>
-          <a:srcRect l="30518" t="1775" r="550" b="1029"/>
+          <a:srcRect l="30642" t="1279" r="229" b="1236"/>
           <a:stretch/>
         </p:blipFill>
         <p:spPr>
           <a:xfrm>
-            <a:off x="6525490" y="2971800"/>
-            <a:ext cx="11450783" cy="6961909"/>
+            <a:off x="6733308" y="3538847"/>
+            <a:ext cx="11483440" cy="6982692"/>
           </a:xfrm>
           <a:prstGeom prst="rect">
             <a:avLst/>

</xml_diff>